<commit_message>
Update presentation and fix demos
</commit_message>
<xml_diff>
--- a/presentation/Intro to Forth.pptx
+++ b/presentation/Intro to Forth.pptx
@@ -4,54 +4,58 @@
   <p:sldMasterIdLst>
     <p:sldMasterId id="2147483648" r:id="rId1"/>
   </p:sldMasterIdLst>
+  <p:notesMasterIdLst>
+    <p:notesMasterId r:id="rId50"/>
+  </p:notesMasterIdLst>
   <p:sldIdLst>
     <p:sldId id="256" r:id="rId2"/>
     <p:sldId id="258" r:id="rId3"/>
     <p:sldId id="259" r:id="rId4"/>
     <p:sldId id="260" r:id="rId5"/>
-    <p:sldId id="262" r:id="rId6"/>
-    <p:sldId id="263" r:id="rId7"/>
-    <p:sldId id="264" r:id="rId8"/>
-    <p:sldId id="265" r:id="rId9"/>
-    <p:sldId id="266" r:id="rId10"/>
-    <p:sldId id="267" r:id="rId11"/>
-    <p:sldId id="290" r:id="rId12"/>
-    <p:sldId id="268" r:id="rId13"/>
-    <p:sldId id="291" r:id="rId14"/>
-    <p:sldId id="269" r:id="rId15"/>
-    <p:sldId id="292" r:id="rId16"/>
-    <p:sldId id="270" r:id="rId17"/>
-    <p:sldId id="293" r:id="rId18"/>
-    <p:sldId id="271" r:id="rId19"/>
-    <p:sldId id="272" r:id="rId20"/>
-    <p:sldId id="273" r:id="rId21"/>
-    <p:sldId id="294" r:id="rId22"/>
-    <p:sldId id="295" r:id="rId23"/>
-    <p:sldId id="297" r:id="rId24"/>
-    <p:sldId id="296" r:id="rId25"/>
-    <p:sldId id="298" r:id="rId26"/>
-    <p:sldId id="274" r:id="rId27"/>
-    <p:sldId id="299" r:id="rId28"/>
-    <p:sldId id="276" r:id="rId29"/>
-    <p:sldId id="300" r:id="rId30"/>
-    <p:sldId id="277" r:id="rId31"/>
-    <p:sldId id="301" r:id="rId32"/>
-    <p:sldId id="279" r:id="rId33"/>
-    <p:sldId id="278" r:id="rId34"/>
-    <p:sldId id="302" r:id="rId35"/>
-    <p:sldId id="280" r:id="rId36"/>
-    <p:sldId id="303" r:id="rId37"/>
-    <p:sldId id="281" r:id="rId38"/>
-    <p:sldId id="304" r:id="rId39"/>
-    <p:sldId id="282" r:id="rId40"/>
-    <p:sldId id="305" r:id="rId41"/>
-    <p:sldId id="284" r:id="rId42"/>
-    <p:sldId id="306" r:id="rId43"/>
-    <p:sldId id="285" r:id="rId44"/>
+    <p:sldId id="307" r:id="rId6"/>
+    <p:sldId id="262" r:id="rId7"/>
+    <p:sldId id="263" r:id="rId8"/>
+    <p:sldId id="264" r:id="rId9"/>
+    <p:sldId id="265" r:id="rId10"/>
+    <p:sldId id="266" r:id="rId11"/>
+    <p:sldId id="267" r:id="rId12"/>
+    <p:sldId id="290" r:id="rId13"/>
+    <p:sldId id="268" r:id="rId14"/>
+    <p:sldId id="291" r:id="rId15"/>
+    <p:sldId id="269" r:id="rId16"/>
+    <p:sldId id="292" r:id="rId17"/>
+    <p:sldId id="270" r:id="rId18"/>
+    <p:sldId id="293" r:id="rId19"/>
+    <p:sldId id="271" r:id="rId20"/>
+    <p:sldId id="272" r:id="rId21"/>
+    <p:sldId id="273" r:id="rId22"/>
+    <p:sldId id="294" r:id="rId23"/>
+    <p:sldId id="295" r:id="rId24"/>
+    <p:sldId id="297" r:id="rId25"/>
+    <p:sldId id="296" r:id="rId26"/>
+    <p:sldId id="298" r:id="rId27"/>
+    <p:sldId id="274" r:id="rId28"/>
+    <p:sldId id="299" r:id="rId29"/>
+    <p:sldId id="276" r:id="rId30"/>
+    <p:sldId id="300" r:id="rId31"/>
+    <p:sldId id="277" r:id="rId32"/>
+    <p:sldId id="301" r:id="rId33"/>
+    <p:sldId id="279" r:id="rId34"/>
+    <p:sldId id="278" r:id="rId35"/>
+    <p:sldId id="302" r:id="rId36"/>
+    <p:sldId id="280" r:id="rId37"/>
+    <p:sldId id="303" r:id="rId38"/>
+    <p:sldId id="281" r:id="rId39"/>
+    <p:sldId id="304" r:id="rId40"/>
+    <p:sldId id="282" r:id="rId41"/>
+    <p:sldId id="305" r:id="rId42"/>
+    <p:sldId id="284" r:id="rId43"/>
+    <p:sldId id="306" r:id="rId44"/>
     <p:sldId id="286" r:id="rId45"/>
-    <p:sldId id="287" r:id="rId46"/>
-    <p:sldId id="288" r:id="rId47"/>
-    <p:sldId id="289" r:id="rId48"/>
+    <p:sldId id="285" r:id="rId46"/>
+    <p:sldId id="287" r:id="rId47"/>
+    <p:sldId id="288" r:id="rId48"/>
+    <p:sldId id="289" r:id="rId49"/>
   </p:sldIdLst>
   <p:sldSz cx="12192000" cy="6858000"/>
   <p:notesSz cx="6858000" cy="9144000"/>
@@ -156,6 +160,467 @@
     </p:ext>
   </p:extLst>
 </p:presentation>
+</file>
+
+<file path=ppt/commentAuthors.xml><?xml version="1.0" encoding="utf-8"?>
+<p:cmAuthorLst xmlns:a="http://schemas.openxmlformats.org/drawingml/2006/main" xmlns:r="http://schemas.openxmlformats.org/officeDocument/2006/relationships" xmlns:p="http://schemas.openxmlformats.org/presentationml/2006/main">
+  <p:cmAuthor id="1" name="David Albert Johnson" initials="DAJ" lastIdx="2" clrIdx="0">
+    <p:extLst>
+      <p:ext uri="{19B8F6BF-5375-455C-9EA6-DF929625EA0E}">
+        <p15:presenceInfo xmlns:p15="http://schemas.microsoft.com/office/powerpoint/2012/main" userId="S-1-5-21-1259209290-282611507-928725530-25573" providerId="AD"/>
+      </p:ext>
+    </p:extLst>
+  </p:cmAuthor>
+</p:cmAuthorLst>
+</file>
+
+<file path=ppt/notesMasters/notesMaster1.xml><?xml version="1.0" encoding="utf-8"?>
+<p:notesMaster xmlns:a="http://schemas.openxmlformats.org/drawingml/2006/main" xmlns:r="http://schemas.openxmlformats.org/officeDocument/2006/relationships" xmlns:p="http://schemas.openxmlformats.org/presentationml/2006/main">
+  <p:cSld>
+    <p:bg>
+      <p:bgRef idx="1001">
+        <a:schemeClr val="bg1"/>
+      </p:bgRef>
+    </p:bg>
+    <p:spTree>
+      <p:nvGrpSpPr>
+        <p:cNvPr id="1" name=""/>
+        <p:cNvGrpSpPr/>
+        <p:nvPr/>
+      </p:nvGrpSpPr>
+      <p:grpSpPr>
+        <a:xfrm>
+          <a:off x="0" y="0"/>
+          <a:ext cx="0" cy="0"/>
+          <a:chOff x="0" y="0"/>
+          <a:chExt cx="0" cy="0"/>
+        </a:xfrm>
+      </p:grpSpPr>
+      <p:sp>
+        <p:nvSpPr>
+          <p:cNvPr id="2" name="Header Placeholder 1"/>
+          <p:cNvSpPr>
+            <a:spLocks noGrp="1"/>
+          </p:cNvSpPr>
+          <p:nvPr>
+            <p:ph type="hdr" sz="quarter"/>
+          </p:nvPr>
+        </p:nvSpPr>
+        <p:spPr>
+          <a:xfrm>
+            <a:off x="0" y="0"/>
+            <a:ext cx="2971800" cy="458788"/>
+          </a:xfrm>
+          <a:prstGeom prst="rect">
+            <a:avLst/>
+          </a:prstGeom>
+        </p:spPr>
+        <p:txBody>
+          <a:bodyPr vert="horz" lIns="91440" tIns="45720" rIns="91440" bIns="45720" rtlCol="0"/>
+          <a:lstStyle>
+            <a:lvl1pPr algn="l">
+              <a:defRPr sz="1200"/>
+            </a:lvl1pPr>
+          </a:lstStyle>
+          <a:p>
+            <a:endParaRPr lang="en-US"/>
+          </a:p>
+        </p:txBody>
+      </p:sp>
+      <p:sp>
+        <p:nvSpPr>
+          <p:cNvPr id="3" name="Date Placeholder 2"/>
+          <p:cNvSpPr>
+            <a:spLocks noGrp="1"/>
+          </p:cNvSpPr>
+          <p:nvPr>
+            <p:ph type="dt" idx="1"/>
+          </p:nvPr>
+        </p:nvSpPr>
+        <p:spPr>
+          <a:xfrm>
+            <a:off x="3884613" y="0"/>
+            <a:ext cx="2971800" cy="458788"/>
+          </a:xfrm>
+          <a:prstGeom prst="rect">
+            <a:avLst/>
+          </a:prstGeom>
+        </p:spPr>
+        <p:txBody>
+          <a:bodyPr vert="horz" lIns="91440" tIns="45720" rIns="91440" bIns="45720" rtlCol="0"/>
+          <a:lstStyle>
+            <a:lvl1pPr algn="r">
+              <a:defRPr sz="1200"/>
+            </a:lvl1pPr>
+          </a:lstStyle>
+          <a:p>
+            <a:fld id="{35C4A536-B4D1-454F-A8D3-E974F380F195}" type="datetimeFigureOut">
+              <a:rPr lang="en-US" smtClean="0"/>
+              <a:t>9/13/2018</a:t>
+            </a:fld>
+            <a:endParaRPr lang="en-US"/>
+          </a:p>
+        </p:txBody>
+      </p:sp>
+      <p:sp>
+        <p:nvSpPr>
+          <p:cNvPr id="4" name="Slide Image Placeholder 3"/>
+          <p:cNvSpPr>
+            <a:spLocks noGrp="1" noRot="1" noChangeAspect="1"/>
+          </p:cNvSpPr>
+          <p:nvPr>
+            <p:ph type="sldImg" idx="2"/>
+          </p:nvPr>
+        </p:nvSpPr>
+        <p:spPr>
+          <a:xfrm>
+            <a:off x="685800" y="1143000"/>
+            <a:ext cx="5486400" cy="3086100"/>
+          </a:xfrm>
+          <a:prstGeom prst="rect">
+            <a:avLst/>
+          </a:prstGeom>
+          <a:noFill/>
+          <a:ln w="12700">
+            <a:solidFill>
+              <a:prstClr val="black"/>
+            </a:solidFill>
+          </a:ln>
+        </p:spPr>
+        <p:txBody>
+          <a:bodyPr vert="horz" lIns="91440" tIns="45720" rIns="91440" bIns="45720" rtlCol="0" anchor="ctr"/>
+          <a:lstStyle/>
+          <a:p>
+            <a:endParaRPr lang="en-US"/>
+          </a:p>
+        </p:txBody>
+      </p:sp>
+      <p:sp>
+        <p:nvSpPr>
+          <p:cNvPr id="5" name="Notes Placeholder 4"/>
+          <p:cNvSpPr>
+            <a:spLocks noGrp="1"/>
+          </p:cNvSpPr>
+          <p:nvPr>
+            <p:ph type="body" sz="quarter" idx="3"/>
+          </p:nvPr>
+        </p:nvSpPr>
+        <p:spPr>
+          <a:xfrm>
+            <a:off x="685800" y="4400550"/>
+            <a:ext cx="5486400" cy="3600450"/>
+          </a:xfrm>
+          <a:prstGeom prst="rect">
+            <a:avLst/>
+          </a:prstGeom>
+        </p:spPr>
+        <p:txBody>
+          <a:bodyPr vert="horz" lIns="91440" tIns="45720" rIns="91440" bIns="45720" rtlCol="0"/>
+          <a:lstStyle/>
+          <a:p>
+            <a:pPr lvl="0"/>
+            <a:r>
+              <a:rPr lang="en-US"/>
+              <a:t>Edit Master text styles</a:t>
+            </a:r>
+          </a:p>
+          <a:p>
+            <a:pPr lvl="1"/>
+            <a:r>
+              <a:rPr lang="en-US"/>
+              <a:t>Second level</a:t>
+            </a:r>
+          </a:p>
+          <a:p>
+            <a:pPr lvl="2"/>
+            <a:r>
+              <a:rPr lang="en-US"/>
+              <a:t>Third level</a:t>
+            </a:r>
+          </a:p>
+          <a:p>
+            <a:pPr lvl="3"/>
+            <a:r>
+              <a:rPr lang="en-US"/>
+              <a:t>Fourth level</a:t>
+            </a:r>
+          </a:p>
+          <a:p>
+            <a:pPr lvl="4"/>
+            <a:r>
+              <a:rPr lang="en-US"/>
+              <a:t>Fifth level</a:t>
+            </a:r>
+          </a:p>
+        </p:txBody>
+      </p:sp>
+      <p:sp>
+        <p:nvSpPr>
+          <p:cNvPr id="6" name="Footer Placeholder 5"/>
+          <p:cNvSpPr>
+            <a:spLocks noGrp="1"/>
+          </p:cNvSpPr>
+          <p:nvPr>
+            <p:ph type="ftr" sz="quarter" idx="4"/>
+          </p:nvPr>
+        </p:nvSpPr>
+        <p:spPr>
+          <a:xfrm>
+            <a:off x="0" y="8685213"/>
+            <a:ext cx="2971800" cy="458787"/>
+          </a:xfrm>
+          <a:prstGeom prst="rect">
+            <a:avLst/>
+          </a:prstGeom>
+        </p:spPr>
+        <p:txBody>
+          <a:bodyPr vert="horz" lIns="91440" tIns="45720" rIns="91440" bIns="45720" rtlCol="0" anchor="b"/>
+          <a:lstStyle>
+            <a:lvl1pPr algn="l">
+              <a:defRPr sz="1200"/>
+            </a:lvl1pPr>
+          </a:lstStyle>
+          <a:p>
+            <a:endParaRPr lang="en-US"/>
+          </a:p>
+        </p:txBody>
+      </p:sp>
+      <p:sp>
+        <p:nvSpPr>
+          <p:cNvPr id="7" name="Slide Number Placeholder 6"/>
+          <p:cNvSpPr>
+            <a:spLocks noGrp="1"/>
+          </p:cNvSpPr>
+          <p:nvPr>
+            <p:ph type="sldNum" sz="quarter" idx="5"/>
+          </p:nvPr>
+        </p:nvSpPr>
+        <p:spPr>
+          <a:xfrm>
+            <a:off x="3884613" y="8685213"/>
+            <a:ext cx="2971800" cy="458787"/>
+          </a:xfrm>
+          <a:prstGeom prst="rect">
+            <a:avLst/>
+          </a:prstGeom>
+        </p:spPr>
+        <p:txBody>
+          <a:bodyPr vert="horz" lIns="91440" tIns="45720" rIns="91440" bIns="45720" rtlCol="0" anchor="b"/>
+          <a:lstStyle>
+            <a:lvl1pPr algn="r">
+              <a:defRPr sz="1200"/>
+            </a:lvl1pPr>
+          </a:lstStyle>
+          <a:p>
+            <a:fld id="{681499E7-2E66-40E9-9428-8FED09AAD22F}" type="slidenum">
+              <a:rPr lang="en-US" smtClean="0"/>
+              <a:t>‹#›</a:t>
+            </a:fld>
+            <a:endParaRPr lang="en-US"/>
+          </a:p>
+        </p:txBody>
+      </p:sp>
+    </p:spTree>
+    <p:extLst>
+      <p:ext uri="{BB962C8B-B14F-4D97-AF65-F5344CB8AC3E}">
+        <p14:creationId xmlns:p14="http://schemas.microsoft.com/office/powerpoint/2010/main" val="1373406326"/>
+      </p:ext>
+    </p:extLst>
+  </p:cSld>
+  <p:clrMap bg1="lt1" tx1="dk1" bg2="lt2" tx2="dk2" accent1="accent1" accent2="accent2" accent3="accent3" accent4="accent4" accent5="accent5" accent6="accent6" hlink="hlink" folHlink="folHlink"/>
+  <p:notesStyle>
+    <a:lvl1pPr marL="0" algn="l" defTabSz="914400" rtl="0" eaLnBrk="1" latinLnBrk="0" hangingPunct="1">
+      <a:defRPr sz="1200" kern="1200">
+        <a:solidFill>
+          <a:schemeClr val="tx1"/>
+        </a:solidFill>
+        <a:latin typeface="+mn-lt"/>
+        <a:ea typeface="+mn-ea"/>
+        <a:cs typeface="+mn-cs"/>
+      </a:defRPr>
+    </a:lvl1pPr>
+    <a:lvl2pPr marL="457200" algn="l" defTabSz="914400" rtl="0" eaLnBrk="1" latinLnBrk="0" hangingPunct="1">
+      <a:defRPr sz="1200" kern="1200">
+        <a:solidFill>
+          <a:schemeClr val="tx1"/>
+        </a:solidFill>
+        <a:latin typeface="+mn-lt"/>
+        <a:ea typeface="+mn-ea"/>
+        <a:cs typeface="+mn-cs"/>
+      </a:defRPr>
+    </a:lvl2pPr>
+    <a:lvl3pPr marL="914400" algn="l" defTabSz="914400" rtl="0" eaLnBrk="1" latinLnBrk="0" hangingPunct="1">
+      <a:defRPr sz="1200" kern="1200">
+        <a:solidFill>
+          <a:schemeClr val="tx1"/>
+        </a:solidFill>
+        <a:latin typeface="+mn-lt"/>
+        <a:ea typeface="+mn-ea"/>
+        <a:cs typeface="+mn-cs"/>
+      </a:defRPr>
+    </a:lvl3pPr>
+    <a:lvl4pPr marL="1371600" algn="l" defTabSz="914400" rtl="0" eaLnBrk="1" latinLnBrk="0" hangingPunct="1">
+      <a:defRPr sz="1200" kern="1200">
+        <a:solidFill>
+          <a:schemeClr val="tx1"/>
+        </a:solidFill>
+        <a:latin typeface="+mn-lt"/>
+        <a:ea typeface="+mn-ea"/>
+        <a:cs typeface="+mn-cs"/>
+      </a:defRPr>
+    </a:lvl4pPr>
+    <a:lvl5pPr marL="1828800" algn="l" defTabSz="914400" rtl="0" eaLnBrk="1" latinLnBrk="0" hangingPunct="1">
+      <a:defRPr sz="1200" kern="1200">
+        <a:solidFill>
+          <a:schemeClr val="tx1"/>
+        </a:solidFill>
+        <a:latin typeface="+mn-lt"/>
+        <a:ea typeface="+mn-ea"/>
+        <a:cs typeface="+mn-cs"/>
+      </a:defRPr>
+    </a:lvl5pPr>
+    <a:lvl6pPr marL="2286000" algn="l" defTabSz="914400" rtl="0" eaLnBrk="1" latinLnBrk="0" hangingPunct="1">
+      <a:defRPr sz="1200" kern="1200">
+        <a:solidFill>
+          <a:schemeClr val="tx1"/>
+        </a:solidFill>
+        <a:latin typeface="+mn-lt"/>
+        <a:ea typeface="+mn-ea"/>
+        <a:cs typeface="+mn-cs"/>
+      </a:defRPr>
+    </a:lvl6pPr>
+    <a:lvl7pPr marL="2743200" algn="l" defTabSz="914400" rtl="0" eaLnBrk="1" latinLnBrk="0" hangingPunct="1">
+      <a:defRPr sz="1200" kern="1200">
+        <a:solidFill>
+          <a:schemeClr val="tx1"/>
+        </a:solidFill>
+        <a:latin typeface="+mn-lt"/>
+        <a:ea typeface="+mn-ea"/>
+        <a:cs typeface="+mn-cs"/>
+      </a:defRPr>
+    </a:lvl7pPr>
+    <a:lvl8pPr marL="3200400" algn="l" defTabSz="914400" rtl="0" eaLnBrk="1" latinLnBrk="0" hangingPunct="1">
+      <a:defRPr sz="1200" kern="1200">
+        <a:solidFill>
+          <a:schemeClr val="tx1"/>
+        </a:solidFill>
+        <a:latin typeface="+mn-lt"/>
+        <a:ea typeface="+mn-ea"/>
+        <a:cs typeface="+mn-cs"/>
+      </a:defRPr>
+    </a:lvl8pPr>
+    <a:lvl9pPr marL="3657600" algn="l" defTabSz="914400" rtl="0" eaLnBrk="1" latinLnBrk="0" hangingPunct="1">
+      <a:defRPr sz="1200" kern="1200">
+        <a:solidFill>
+          <a:schemeClr val="tx1"/>
+        </a:solidFill>
+        <a:latin typeface="+mn-lt"/>
+        <a:ea typeface="+mn-ea"/>
+        <a:cs typeface="+mn-cs"/>
+      </a:defRPr>
+    </a:lvl9pPr>
+  </p:notesStyle>
+</p:notesMaster>
+</file>
+
+<file path=ppt/notesSlides/notesSlide1.xml><?xml version="1.0" encoding="utf-8"?>
+<p:notes xmlns:a="http://schemas.openxmlformats.org/drawingml/2006/main" xmlns:r="http://schemas.openxmlformats.org/officeDocument/2006/relationships" xmlns:p="http://schemas.openxmlformats.org/presentationml/2006/main">
+  <p:cSld>
+    <p:spTree>
+      <p:nvGrpSpPr>
+        <p:cNvPr id="1" name=""/>
+        <p:cNvGrpSpPr/>
+        <p:nvPr/>
+      </p:nvGrpSpPr>
+      <p:grpSpPr>
+        <a:xfrm>
+          <a:off x="0" y="0"/>
+          <a:ext cx="0" cy="0"/>
+          <a:chOff x="0" y="0"/>
+          <a:chExt cx="0" cy="0"/>
+        </a:xfrm>
+      </p:grpSpPr>
+      <p:sp>
+        <p:nvSpPr>
+          <p:cNvPr id="2" name="Slide Image Placeholder 1"/>
+          <p:cNvSpPr>
+            <a:spLocks noGrp="1" noRot="1" noChangeAspect="1"/>
+          </p:cNvSpPr>
+          <p:nvPr>
+            <p:ph type="sldImg"/>
+          </p:nvPr>
+        </p:nvSpPr>
+        <p:spPr/>
+      </p:sp>
+      <p:sp>
+        <p:nvSpPr>
+          <p:cNvPr id="3" name="Notes Placeholder 2"/>
+          <p:cNvSpPr>
+            <a:spLocks noGrp="1"/>
+          </p:cNvSpPr>
+          <p:nvPr>
+            <p:ph type="body" idx="1"/>
+          </p:nvPr>
+        </p:nvSpPr>
+        <p:spPr/>
+        <p:txBody>
+          <a:bodyPr/>
+          <a:lstStyle/>
+          <a:p>
+            <a:r>
+              <a:rPr lang="en-US" dirty="0"/>
+              <a:t>s" </a:t>
+            </a:r>
+            <a:r>
+              <a:rPr lang="en-US" i="1" dirty="0" err="1"/>
+              <a:t>file.fs</a:t>
+            </a:r>
+            <a:r>
+              <a:rPr lang="en-US" dirty="0"/>
+              <a:t>" included to load forth file in </a:t>
+            </a:r>
+            <a:r>
+              <a:rPr lang="en-US" dirty="0" err="1"/>
+              <a:t>gforth</a:t>
+            </a:r>
+            <a:endParaRPr lang="en-US" dirty="0"/>
+          </a:p>
+        </p:txBody>
+      </p:sp>
+      <p:sp>
+        <p:nvSpPr>
+          <p:cNvPr id="4" name="Slide Number Placeholder 3"/>
+          <p:cNvSpPr>
+            <a:spLocks noGrp="1"/>
+          </p:cNvSpPr>
+          <p:nvPr>
+            <p:ph type="sldNum" sz="quarter" idx="10"/>
+          </p:nvPr>
+        </p:nvSpPr>
+        <p:spPr/>
+        <p:txBody>
+          <a:bodyPr/>
+          <a:lstStyle/>
+          <a:p>
+            <a:fld id="{681499E7-2E66-40E9-9428-8FED09AAD22F}" type="slidenum">
+              <a:rPr lang="en-US" smtClean="0"/>
+              <a:t>46</a:t>
+            </a:fld>
+            <a:endParaRPr lang="en-US"/>
+          </a:p>
+        </p:txBody>
+      </p:sp>
+    </p:spTree>
+    <p:extLst>
+      <p:ext uri="{BB962C8B-B14F-4D97-AF65-F5344CB8AC3E}">
+        <p14:creationId xmlns:p14="http://schemas.microsoft.com/office/powerpoint/2010/main" val="2159376167"/>
+      </p:ext>
+    </p:extLst>
+  </p:cSld>
+  <p:clrMapOvr>
+    <a:masterClrMapping/>
+  </p:clrMapOvr>
+</p:notes>
 </file>
 
 <file path=ppt/slideLayouts/slideLayout1.xml><?xml version="1.0" encoding="utf-8"?>
@@ -4440,7 +4905,7 @@
           <a:p>
             <a:fld id="{48A87A34-81AB-432B-8DAE-1953F412C126}" type="datetimeFigureOut">
               <a:rPr lang="en-US" dirty="0"/>
-              <a:t>9/11/2018</a:t>
+              <a:t>9/13/2018</a:t>
             </a:fld>
             <a:endParaRPr lang="en-US" dirty="0"/>
           </a:p>
@@ -4702,7 +5167,7 @@
           <a:p>
             <a:fld id="{48A87A34-81AB-432B-8DAE-1953F412C126}" type="datetimeFigureOut">
               <a:rPr lang="en-US" dirty="0"/>
-              <a:t>9/11/2018</a:t>
+              <a:t>9/13/2018</a:t>
             </a:fld>
             <a:endParaRPr lang="en-US" dirty="0"/>
           </a:p>
@@ -4893,7 +5358,7 @@
           <a:p>
             <a:fld id="{48A87A34-81AB-432B-8DAE-1953F412C126}" type="datetimeFigureOut">
               <a:rPr lang="en-US" dirty="0"/>
-              <a:t>9/11/2018</a:t>
+              <a:t>9/13/2018</a:t>
             </a:fld>
             <a:endParaRPr lang="en-US" dirty="0"/>
           </a:p>
@@ -5151,7 +5616,7 @@
           <a:p>
             <a:fld id="{48A87A34-81AB-432B-8DAE-1953F412C126}" type="datetimeFigureOut">
               <a:rPr lang="en-US" dirty="0"/>
-              <a:t>9/11/2018</a:t>
+              <a:t>9/13/2018</a:t>
             </a:fld>
             <a:endParaRPr lang="en-US" dirty="0"/>
           </a:p>
@@ -5580,7 +6045,7 @@
           <a:p>
             <a:fld id="{48A87A34-81AB-432B-8DAE-1953F412C126}" type="datetimeFigureOut">
               <a:rPr lang="en-US" dirty="0"/>
-              <a:t>9/11/2018</a:t>
+              <a:t>9/13/2018</a:t>
             </a:fld>
             <a:endParaRPr lang="en-US" dirty="0"/>
           </a:p>
@@ -6121,7 +6586,7 @@
           <a:p>
             <a:fld id="{48A87A34-81AB-432B-8DAE-1953F412C126}" type="datetimeFigureOut">
               <a:rPr lang="en-US" dirty="0"/>
-              <a:t>9/11/2018</a:t>
+              <a:t>9/13/2018</a:t>
             </a:fld>
             <a:endParaRPr lang="en-US" dirty="0"/>
           </a:p>
@@ -6836,7 +7301,7 @@
           <a:p>
             <a:fld id="{48A87A34-81AB-432B-8DAE-1953F412C126}" type="datetimeFigureOut">
               <a:rPr lang="en-US" dirty="0"/>
-              <a:t>9/11/2018</a:t>
+              <a:t>9/13/2018</a:t>
             </a:fld>
             <a:endParaRPr lang="en-US" dirty="0"/>
           </a:p>
@@ -7001,7 +7466,7 @@
           <a:p>
             <a:fld id="{48A87A34-81AB-432B-8DAE-1953F412C126}" type="datetimeFigureOut">
               <a:rPr lang="en-US" dirty="0"/>
-              <a:t>9/11/2018</a:t>
+              <a:t>9/13/2018</a:t>
             </a:fld>
             <a:endParaRPr lang="en-US" dirty="0"/>
           </a:p>
@@ -7176,7 +7641,7 @@
           <a:p>
             <a:fld id="{48A87A34-81AB-432B-8DAE-1953F412C126}" type="datetimeFigureOut">
               <a:rPr lang="en-US" dirty="0"/>
-              <a:t>9/11/2018</a:t>
+              <a:t>9/13/2018</a:t>
             </a:fld>
             <a:endParaRPr lang="en-US" dirty="0"/>
           </a:p>
@@ -7341,7 +7806,7 @@
           <a:p>
             <a:fld id="{48A87A34-81AB-432B-8DAE-1953F412C126}" type="datetimeFigureOut">
               <a:rPr lang="en-US" dirty="0"/>
-              <a:t>9/11/2018</a:t>
+              <a:t>9/13/2018</a:t>
             </a:fld>
             <a:endParaRPr lang="en-US" dirty="0"/>
           </a:p>
@@ -7586,7 +8051,7 @@
           <a:p>
             <a:fld id="{48A87A34-81AB-432B-8DAE-1953F412C126}" type="datetimeFigureOut">
               <a:rPr lang="en-US" dirty="0"/>
-              <a:t>9/11/2018</a:t>
+              <a:t>9/13/2018</a:t>
             </a:fld>
             <a:endParaRPr lang="en-US" dirty="0"/>
           </a:p>
@@ -7813,7 +8278,7 @@
           <a:p>
             <a:fld id="{48A87A34-81AB-432B-8DAE-1953F412C126}" type="datetimeFigureOut">
               <a:rPr lang="en-US" dirty="0"/>
-              <a:t>9/11/2018</a:t>
+              <a:t>9/13/2018</a:t>
             </a:fld>
             <a:endParaRPr lang="en-US" dirty="0"/>
           </a:p>
@@ -8189,7 +8654,7 @@
           <a:p>
             <a:fld id="{48A87A34-81AB-432B-8DAE-1953F412C126}" type="datetimeFigureOut">
               <a:rPr lang="en-US" dirty="0"/>
-              <a:t>9/11/2018</a:t>
+              <a:t>9/13/2018</a:t>
             </a:fld>
             <a:endParaRPr lang="en-US" dirty="0"/>
           </a:p>
@@ -8302,7 +8767,7 @@
           <a:p>
             <a:fld id="{48A87A34-81AB-432B-8DAE-1953F412C126}" type="datetimeFigureOut">
               <a:rPr lang="en-US" dirty="0"/>
-              <a:t>9/11/2018</a:t>
+              <a:t>9/13/2018</a:t>
             </a:fld>
             <a:endParaRPr lang="en-US" dirty="0"/>
           </a:p>
@@ -8392,7 +8857,7 @@
           <a:p>
             <a:fld id="{48A87A34-81AB-432B-8DAE-1953F412C126}" type="datetimeFigureOut">
               <a:rPr lang="en-US" dirty="0"/>
-              <a:t>9/11/2018</a:t>
+              <a:t>9/13/2018</a:t>
             </a:fld>
             <a:endParaRPr lang="en-US" dirty="0"/>
           </a:p>
@@ -8636,7 +9101,7 @@
           <a:p>
             <a:fld id="{48A87A34-81AB-432B-8DAE-1953F412C126}" type="datetimeFigureOut">
               <a:rPr lang="en-US" dirty="0"/>
-              <a:t>9/11/2018</a:t>
+              <a:t>9/13/2018</a:t>
             </a:fld>
             <a:endParaRPr lang="en-US" dirty="0"/>
           </a:p>
@@ -8911,7 +9376,7 @@
           <a:p>
             <a:fld id="{48A87A34-81AB-432B-8DAE-1953F412C126}" type="datetimeFigureOut">
               <a:rPr lang="en-US" dirty="0"/>
-              <a:t>9/11/2018</a:t>
+              <a:t>9/13/2018</a:t>
             </a:fld>
             <a:endParaRPr lang="en-US" dirty="0"/>
           </a:p>
@@ -11974,7 +12439,7 @@
             <a:fld id="{48A87A34-81AB-432B-8DAE-1953F412C126}" type="datetimeFigureOut">
               <a:rPr lang="en-US" dirty="0"/>
               <a:pPr/>
-              <a:t>9/11/2018</a:t>
+              <a:t>9/13/2018</a:t>
             </a:fld>
             <a:endParaRPr lang="en-US" dirty="0"/>
           </a:p>
@@ -12481,6 +12946,144 @@
           <p:cNvPr id="2" name="Title 1">
             <a:extLst>
               <a:ext uri="{FF2B5EF4-FFF2-40B4-BE49-F238E27FC236}">
+                <a16:creationId xmlns:a16="http://schemas.microsoft.com/office/drawing/2014/main" id="{6BA2DF35-CFE7-4D01-806F-7250FB9DE2F2}"/>
+              </a:ext>
+            </a:extLst>
+          </p:cNvPr>
+          <p:cNvSpPr>
+            <a:spLocks noGrp="1"/>
+          </p:cNvSpPr>
+          <p:nvPr>
+            <p:ph type="title"/>
+          </p:nvPr>
+        </p:nvSpPr>
+        <p:spPr/>
+        <p:txBody>
+          <a:bodyPr/>
+          <a:lstStyle/>
+          <a:p>
+            <a:r>
+              <a:rPr lang="en-US" dirty="0"/>
+              <a:t>Stack comments	</a:t>
+            </a:r>
+          </a:p>
+        </p:txBody>
+      </p:sp>
+      <p:sp>
+        <p:nvSpPr>
+          <p:cNvPr id="3" name="Content Placeholder 2">
+            <a:extLst>
+              <a:ext uri="{FF2B5EF4-FFF2-40B4-BE49-F238E27FC236}">
+                <a16:creationId xmlns:a16="http://schemas.microsoft.com/office/drawing/2014/main" id="{8EBBCD17-21A7-47A4-B41B-83E9FD2797DD}"/>
+              </a:ext>
+            </a:extLst>
+          </p:cNvPr>
+          <p:cNvSpPr>
+            <a:spLocks noGrp="1"/>
+          </p:cNvSpPr>
+          <p:nvPr>
+            <p:ph idx="1"/>
+          </p:nvPr>
+        </p:nvSpPr>
+        <p:spPr/>
+        <p:txBody>
+          <a:bodyPr/>
+          <a:lstStyle/>
+          <a:p>
+            <a:r>
+              <a:rPr lang="en-US" dirty="0" err="1"/>
+              <a:t>Forth’s</a:t>
+            </a:r>
+            <a:r>
+              <a:rPr lang="en-US" dirty="0"/>
+              <a:t> version of a function signature</a:t>
+            </a:r>
+          </a:p>
+          <a:p>
+            <a:r>
+              <a:rPr lang="en-US" dirty="0"/>
+              <a:t>E.g., ( x1 x2 -- f ) means the word takes two cells and returns a flag</a:t>
+            </a:r>
+          </a:p>
+          <a:p>
+            <a:r>
+              <a:rPr lang="en-US" dirty="0"/>
+              <a:t>Customary abbreviations</a:t>
+            </a:r>
+          </a:p>
+          <a:p>
+            <a:pPr lvl="1"/>
+            <a:r>
+              <a:rPr lang="en-US" dirty="0"/>
+              <a:t>W – a general cell</a:t>
+            </a:r>
+          </a:p>
+          <a:p>
+            <a:pPr lvl="1"/>
+            <a:r>
+              <a:rPr lang="en-US" dirty="0"/>
+              <a:t>N – a signed integer</a:t>
+            </a:r>
+          </a:p>
+          <a:p>
+            <a:pPr lvl="1"/>
+            <a:r>
+              <a:rPr lang="en-US" dirty="0"/>
+              <a:t>U – an unsigned integer</a:t>
+            </a:r>
+          </a:p>
+          <a:p>
+            <a:pPr lvl="1"/>
+            <a:r>
+              <a:rPr lang="en-US" dirty="0"/>
+              <a:t>F – a flag (</a:t>
+            </a:r>
+            <a:r>
+              <a:rPr lang="en-US" dirty="0" err="1"/>
+              <a:t>boolean</a:t>
+            </a:r>
+            <a:r>
+              <a:rPr lang="en-US" dirty="0"/>
+              <a:t>)</a:t>
+            </a:r>
+          </a:p>
+        </p:txBody>
+      </p:sp>
+    </p:spTree>
+    <p:extLst>
+      <p:ext uri="{BB962C8B-B14F-4D97-AF65-F5344CB8AC3E}">
+        <p14:creationId xmlns:p14="http://schemas.microsoft.com/office/powerpoint/2010/main" val="2174521702"/>
+      </p:ext>
+    </p:extLst>
+  </p:cSld>
+  <p:clrMapOvr>
+    <a:masterClrMapping/>
+  </p:clrMapOvr>
+</p:sld>
+</file>
+
+<file path=ppt/slides/slide11.xml><?xml version="1.0" encoding="utf-8"?>
+<p:sld xmlns:a="http://schemas.openxmlformats.org/drawingml/2006/main" xmlns:r="http://schemas.openxmlformats.org/officeDocument/2006/relationships" xmlns:p="http://schemas.openxmlformats.org/presentationml/2006/main">
+  <p:cSld>
+    <p:spTree>
+      <p:nvGrpSpPr>
+        <p:cNvPr id="1" name=""/>
+        <p:cNvGrpSpPr/>
+        <p:nvPr/>
+      </p:nvGrpSpPr>
+      <p:grpSpPr>
+        <a:xfrm>
+          <a:off x="0" y="0"/>
+          <a:ext cx="0" cy="0"/>
+          <a:chOff x="0" y="0"/>
+          <a:chExt cx="0" cy="0"/>
+        </a:xfrm>
+      </p:grpSpPr>
+      <p:sp>
+        <p:nvSpPr>
+          <p:cNvPr id="2" name="Title 1">
+            <a:extLst>
+              <a:ext uri="{FF2B5EF4-FFF2-40B4-BE49-F238E27FC236}">
                 <a16:creationId xmlns:a16="http://schemas.microsoft.com/office/drawing/2014/main" id="{FC7B64BC-4DA6-41E1-A3CC-79C24061D66B}"/>
               </a:ext>
             </a:extLst>
@@ -12576,7 +13179,7 @@
 </p:sld>
 </file>
 
-<file path=ppt/slides/slide11.xml><?xml version="1.0" encoding="utf-8"?>
+<file path=ppt/slides/slide12.xml><?xml version="1.0" encoding="utf-8"?>
 <p:sld xmlns:a="http://schemas.openxmlformats.org/drawingml/2006/main" xmlns:r="http://schemas.openxmlformats.org/officeDocument/2006/relationships" xmlns:p="http://schemas.openxmlformats.org/presentationml/2006/main" showMasterSp="0">
   <p:cSld>
     <p:bg>
@@ -12670,7 +13273,7 @@
 </p:sld>
 </file>
 
-<file path=ppt/slides/slide12.xml><?xml version="1.0" encoding="utf-8"?>
+<file path=ppt/slides/slide13.xml><?xml version="1.0" encoding="utf-8"?>
 <p:sld xmlns:a="http://schemas.openxmlformats.org/drawingml/2006/main" xmlns:r="http://schemas.openxmlformats.org/officeDocument/2006/relationships" xmlns:p="http://schemas.openxmlformats.org/presentationml/2006/main">
   <p:cSld>
     <p:spTree>
@@ -12779,7 +13382,7 @@
 </p:sld>
 </file>
 
-<file path=ppt/slides/slide13.xml><?xml version="1.0" encoding="utf-8"?>
+<file path=ppt/slides/slide14.xml><?xml version="1.0" encoding="utf-8"?>
 <p:sld xmlns:a="http://schemas.openxmlformats.org/drawingml/2006/main" xmlns:r="http://schemas.openxmlformats.org/officeDocument/2006/relationships" xmlns:p="http://schemas.openxmlformats.org/presentationml/2006/main" showMasterSp="0">
   <p:cSld>
     <p:bg>
@@ -12873,7 +13476,7 @@
 </p:sld>
 </file>
 
-<file path=ppt/slides/slide14.xml><?xml version="1.0" encoding="utf-8"?>
+<file path=ppt/slides/slide15.xml><?xml version="1.0" encoding="utf-8"?>
 <p:sld xmlns:a="http://schemas.openxmlformats.org/drawingml/2006/main" xmlns:r="http://schemas.openxmlformats.org/officeDocument/2006/relationships" xmlns:p="http://schemas.openxmlformats.org/presentationml/2006/main">
   <p:cSld>
     <p:spTree>
@@ -12977,7 +13580,7 @@
 </p:sld>
 </file>
 
-<file path=ppt/slides/slide15.xml><?xml version="1.0" encoding="utf-8"?>
+<file path=ppt/slides/slide16.xml><?xml version="1.0" encoding="utf-8"?>
 <p:sld xmlns:a="http://schemas.openxmlformats.org/drawingml/2006/main" xmlns:r="http://schemas.openxmlformats.org/officeDocument/2006/relationships" xmlns:p="http://schemas.openxmlformats.org/presentationml/2006/main" showMasterSp="0">
   <p:cSld>
     <p:bg>
@@ -13071,7 +13674,7 @@
 </p:sld>
 </file>
 
-<file path=ppt/slides/slide16.xml><?xml version="1.0" encoding="utf-8"?>
+<file path=ppt/slides/slide17.xml><?xml version="1.0" encoding="utf-8"?>
 <p:sld xmlns:a="http://schemas.openxmlformats.org/drawingml/2006/main" xmlns:r="http://schemas.openxmlformats.org/officeDocument/2006/relationships" xmlns:p="http://schemas.openxmlformats.org/presentationml/2006/main">
   <p:cSld>
     <p:spTree>
@@ -13194,7 +13797,7 @@
 </p:sld>
 </file>
 
-<file path=ppt/slides/slide17.xml><?xml version="1.0" encoding="utf-8"?>
+<file path=ppt/slides/slide18.xml><?xml version="1.0" encoding="utf-8"?>
 <p:sld xmlns:a="http://schemas.openxmlformats.org/drawingml/2006/main" xmlns:r="http://schemas.openxmlformats.org/officeDocument/2006/relationships" xmlns:p="http://schemas.openxmlformats.org/presentationml/2006/main" showMasterSp="0">
   <p:cSld>
     <p:bg>
@@ -13288,141 +13891,6 @@
 </p:sld>
 </file>
 
-<file path=ppt/slides/slide18.xml><?xml version="1.0" encoding="utf-8"?>
-<p:sld xmlns:a="http://schemas.openxmlformats.org/drawingml/2006/main" xmlns:r="http://schemas.openxmlformats.org/officeDocument/2006/relationships" xmlns:p="http://schemas.openxmlformats.org/presentationml/2006/main">
-  <p:cSld>
-    <p:spTree>
-      <p:nvGrpSpPr>
-        <p:cNvPr id="1" name=""/>
-        <p:cNvGrpSpPr/>
-        <p:nvPr/>
-      </p:nvGrpSpPr>
-      <p:grpSpPr>
-        <a:xfrm>
-          <a:off x="0" y="0"/>
-          <a:ext cx="0" cy="0"/>
-          <a:chOff x="0" y="0"/>
-          <a:chExt cx="0" cy="0"/>
-        </a:xfrm>
-      </p:grpSpPr>
-      <p:sp>
-        <p:nvSpPr>
-          <p:cNvPr id="2" name="Title 1">
-            <a:extLst>
-              <a:ext uri="{FF2B5EF4-FFF2-40B4-BE49-F238E27FC236}">
-                <a16:creationId xmlns:a16="http://schemas.microsoft.com/office/drawing/2014/main" id="{E27F0B50-5597-415B-BE3A-E17DA49DF1AA}"/>
-              </a:ext>
-            </a:extLst>
-          </p:cNvPr>
-          <p:cNvSpPr>
-            <a:spLocks noGrp="1"/>
-          </p:cNvSpPr>
-          <p:nvPr>
-            <p:ph type="title"/>
-          </p:nvPr>
-        </p:nvSpPr>
-        <p:spPr/>
-        <p:txBody>
-          <a:bodyPr/>
-          <a:lstStyle/>
-          <a:p>
-            <a:r>
-              <a:rPr lang="en-US" dirty="0"/>
-              <a:t>Infix, postfix, and prefix</a:t>
-            </a:r>
-          </a:p>
-        </p:txBody>
-      </p:sp>
-      <p:sp>
-        <p:nvSpPr>
-          <p:cNvPr id="3" name="Content Placeholder 2">
-            <a:extLst>
-              <a:ext uri="{FF2B5EF4-FFF2-40B4-BE49-F238E27FC236}">
-                <a16:creationId xmlns:a16="http://schemas.microsoft.com/office/drawing/2014/main" id="{171FCC65-E5CD-4F9A-8450-CF81B8D6B95C}"/>
-              </a:ext>
-            </a:extLst>
-          </p:cNvPr>
-          <p:cNvSpPr>
-            <a:spLocks noGrp="1"/>
-          </p:cNvSpPr>
-          <p:nvPr>
-            <p:ph idx="1"/>
-          </p:nvPr>
-        </p:nvSpPr>
-        <p:spPr/>
-        <p:txBody>
-          <a:bodyPr>
-            <a:normAutofit lnSpcReduction="10000"/>
-          </a:bodyPr>
-          <a:lstStyle/>
-          <a:p>
-            <a:r>
-              <a:rPr lang="en-US" dirty="0"/>
-              <a:t>Infix – what we all know</a:t>
-            </a:r>
-          </a:p>
-          <a:p>
-            <a:pPr lvl="1"/>
-            <a:r>
-              <a:rPr lang="en-US" dirty="0"/>
-              <a:t>7 * (2 + 3)</a:t>
-            </a:r>
-          </a:p>
-          <a:p>
-            <a:r>
-              <a:rPr lang="en-US" dirty="0"/>
-              <a:t>Prefix – operation comes before the operands</a:t>
-            </a:r>
-          </a:p>
-          <a:p>
-            <a:pPr lvl="1"/>
-            <a:r>
-              <a:rPr lang="en-US" dirty="0"/>
-              <a:t>(* 7 (+ 2 3))</a:t>
-            </a:r>
-          </a:p>
-          <a:p>
-            <a:pPr lvl="1"/>
-            <a:r>
-              <a:rPr lang="en-US" dirty="0"/>
-              <a:t>This is equivalent to a syntax tree</a:t>
-            </a:r>
-          </a:p>
-          <a:p>
-            <a:r>
-              <a:rPr lang="en-US" dirty="0"/>
-              <a:t>Postfix – what Forth must do because it is stack-based</a:t>
-            </a:r>
-          </a:p>
-          <a:p>
-            <a:pPr lvl="1"/>
-            <a:r>
-              <a:rPr lang="en-US" dirty="0"/>
-              <a:t>2 3 + 7 *</a:t>
-            </a:r>
-          </a:p>
-          <a:p>
-            <a:pPr lvl="1"/>
-            <a:r>
-              <a:rPr lang="en-US" dirty="0"/>
-              <a:t>This has the operations in the order they are performed</a:t>
-            </a:r>
-          </a:p>
-        </p:txBody>
-      </p:sp>
-    </p:spTree>
-    <p:extLst>
-      <p:ext uri="{BB962C8B-B14F-4D97-AF65-F5344CB8AC3E}">
-        <p14:creationId xmlns:p14="http://schemas.microsoft.com/office/powerpoint/2010/main" val="4156086705"/>
-      </p:ext>
-    </p:extLst>
-  </p:cSld>
-  <p:clrMapOvr>
-    <a:masterClrMapping/>
-  </p:clrMapOvr>
-</p:sld>
-</file>
-
 <file path=ppt/slides/slide19.xml><?xml version="1.0" encoding="utf-8"?>
 <p:sld xmlns:a="http://schemas.openxmlformats.org/drawingml/2006/main" xmlns:r="http://schemas.openxmlformats.org/officeDocument/2006/relationships" xmlns:p="http://schemas.openxmlformats.org/presentationml/2006/main">
   <p:cSld>
@@ -13445,7 +13913,7 @@
           <p:cNvPr id="2" name="Title 1">
             <a:extLst>
               <a:ext uri="{FF2B5EF4-FFF2-40B4-BE49-F238E27FC236}">
-                <a16:creationId xmlns:a16="http://schemas.microsoft.com/office/drawing/2014/main" id="{DD36E008-8FB6-443D-A5C6-EEFEEF882DD5}"/>
+                <a16:creationId xmlns:a16="http://schemas.microsoft.com/office/drawing/2014/main" id="{E27F0B50-5597-415B-BE3A-E17DA49DF1AA}"/>
               </a:ext>
             </a:extLst>
           </p:cNvPr>
@@ -13463,7 +13931,7 @@
           <a:p>
             <a:r>
               <a:rPr lang="en-US" dirty="0"/>
-              <a:t>Stack manipulation 1</a:t>
+              <a:t>Infix, postfix, and prefix</a:t>
             </a:r>
           </a:p>
         </p:txBody>
@@ -13473,7 +13941,7 @@
           <p:cNvPr id="3" name="Content Placeholder 2">
             <a:extLst>
               <a:ext uri="{FF2B5EF4-FFF2-40B4-BE49-F238E27FC236}">
-                <a16:creationId xmlns:a16="http://schemas.microsoft.com/office/drawing/2014/main" id="{AD802192-B1D4-410F-868C-4B0C5F3DF378}"/>
+                <a16:creationId xmlns:a16="http://schemas.microsoft.com/office/drawing/2014/main" id="{171FCC65-E5CD-4F9A-8450-CF81B8D6B95C}"/>
               </a:ext>
             </a:extLst>
           </p:cNvPr>
@@ -13486,18 +13954,61 @@
         </p:nvSpPr>
         <p:spPr/>
         <p:txBody>
-          <a:bodyPr/>
+          <a:bodyPr>
+            <a:normAutofit lnSpcReduction="10000"/>
+          </a:bodyPr>
           <a:lstStyle/>
           <a:p>
             <a:r>
               <a:rPr lang="en-US" dirty="0"/>
-              <a:t>It is necessary, but doing a lot of stack manipulation is a code smell</a:t>
-            </a:r>
-          </a:p>
-          <a:p>
-            <a:r>
-              <a:rPr lang="en-US" dirty="0"/>
-              <a:t>Usually is a sign to factor your words into smaller words or reorder how your words use the stack</a:t>
+              <a:t>Infix – what we all know</a:t>
+            </a:r>
+          </a:p>
+          <a:p>
+            <a:pPr lvl="1"/>
+            <a:r>
+              <a:rPr lang="en-US" dirty="0"/>
+              <a:t>7 * (2 + 3)</a:t>
+            </a:r>
+          </a:p>
+          <a:p>
+            <a:r>
+              <a:rPr lang="en-US" dirty="0"/>
+              <a:t>Prefix – operation comes before the operands</a:t>
+            </a:r>
+          </a:p>
+          <a:p>
+            <a:pPr lvl="1"/>
+            <a:r>
+              <a:rPr lang="en-US" dirty="0"/>
+              <a:t>multiply(7, add(2, 3)) or (* 7 (+ 2 3))</a:t>
+            </a:r>
+          </a:p>
+          <a:p>
+            <a:pPr lvl="1"/>
+            <a:r>
+              <a:rPr lang="en-US" dirty="0"/>
+              <a:t>This is equivalent to a syntax tree</a:t>
+            </a:r>
+          </a:p>
+          <a:p>
+            <a:r>
+              <a:rPr lang="en-US" dirty="0"/>
+              <a:t>Postfix – what Forth must do because it is stack-based</a:t>
+            </a:r>
+          </a:p>
+          <a:p>
+            <a:pPr lvl="1"/>
+            <a:r>
+              <a:rPr lang="en-US" dirty="0"/>
+              <a:t>2 3 + 7 *</a:t>
+            </a:r>
+          </a:p>
+          <a:p>
+            <a:pPr lvl="1"/>
+            <a:r>
+              <a:rPr lang="en-US" dirty="0"/>
+              <a:t>This has the operations in the order they are performed</a:t>
             </a:r>
           </a:p>
         </p:txBody>
@@ -13505,7 +14016,7 @@
     </p:spTree>
     <p:extLst>
       <p:ext uri="{BB962C8B-B14F-4D97-AF65-F5344CB8AC3E}">
-        <p14:creationId xmlns:p14="http://schemas.microsoft.com/office/powerpoint/2010/main" val="1555801186"/>
+        <p14:creationId xmlns:p14="http://schemas.microsoft.com/office/powerpoint/2010/main" val="4156086705"/>
       </p:ext>
     </p:extLst>
   </p:cSld>
@@ -13635,6 +14146,98 @@
           <p:cNvPr id="2" name="Title 1">
             <a:extLst>
               <a:ext uri="{FF2B5EF4-FFF2-40B4-BE49-F238E27FC236}">
+                <a16:creationId xmlns:a16="http://schemas.microsoft.com/office/drawing/2014/main" id="{DD36E008-8FB6-443D-A5C6-EEFEEF882DD5}"/>
+              </a:ext>
+            </a:extLst>
+          </p:cNvPr>
+          <p:cNvSpPr>
+            <a:spLocks noGrp="1"/>
+          </p:cNvSpPr>
+          <p:nvPr>
+            <p:ph type="title"/>
+          </p:nvPr>
+        </p:nvSpPr>
+        <p:spPr/>
+        <p:txBody>
+          <a:bodyPr/>
+          <a:lstStyle/>
+          <a:p>
+            <a:r>
+              <a:rPr lang="en-US" dirty="0"/>
+              <a:t>Stack manipulation 1</a:t>
+            </a:r>
+          </a:p>
+        </p:txBody>
+      </p:sp>
+      <p:sp>
+        <p:nvSpPr>
+          <p:cNvPr id="3" name="Content Placeholder 2">
+            <a:extLst>
+              <a:ext uri="{FF2B5EF4-FFF2-40B4-BE49-F238E27FC236}">
+                <a16:creationId xmlns:a16="http://schemas.microsoft.com/office/drawing/2014/main" id="{AD802192-B1D4-410F-868C-4B0C5F3DF378}"/>
+              </a:ext>
+            </a:extLst>
+          </p:cNvPr>
+          <p:cNvSpPr>
+            <a:spLocks noGrp="1"/>
+          </p:cNvSpPr>
+          <p:nvPr>
+            <p:ph idx="1"/>
+          </p:nvPr>
+        </p:nvSpPr>
+        <p:spPr/>
+        <p:txBody>
+          <a:bodyPr/>
+          <a:lstStyle/>
+          <a:p>
+            <a:r>
+              <a:rPr lang="en-US" dirty="0"/>
+              <a:t>It is necessary, but doing a lot of stack manipulation is a code smell</a:t>
+            </a:r>
+          </a:p>
+          <a:p>
+            <a:r>
+              <a:rPr lang="en-US" dirty="0"/>
+              <a:t>Usually is a sign to factor your words into smaller words or reorder how your words use the stack</a:t>
+            </a:r>
+          </a:p>
+        </p:txBody>
+      </p:sp>
+    </p:spTree>
+    <p:extLst>
+      <p:ext uri="{BB962C8B-B14F-4D97-AF65-F5344CB8AC3E}">
+        <p14:creationId xmlns:p14="http://schemas.microsoft.com/office/powerpoint/2010/main" val="1555801186"/>
+      </p:ext>
+    </p:extLst>
+  </p:cSld>
+  <p:clrMapOvr>
+    <a:masterClrMapping/>
+  </p:clrMapOvr>
+</p:sld>
+</file>
+
+<file path=ppt/slides/slide21.xml><?xml version="1.0" encoding="utf-8"?>
+<p:sld xmlns:a="http://schemas.openxmlformats.org/drawingml/2006/main" xmlns:r="http://schemas.openxmlformats.org/officeDocument/2006/relationships" xmlns:p="http://schemas.openxmlformats.org/presentationml/2006/main">
+  <p:cSld>
+    <p:spTree>
+      <p:nvGrpSpPr>
+        <p:cNvPr id="1" name=""/>
+        <p:cNvGrpSpPr/>
+        <p:nvPr/>
+      </p:nvGrpSpPr>
+      <p:grpSpPr>
+        <a:xfrm>
+          <a:off x="0" y="0"/>
+          <a:ext cx="0" cy="0"/>
+          <a:chOff x="0" y="0"/>
+          <a:chExt cx="0" cy="0"/>
+        </a:xfrm>
+      </p:grpSpPr>
+      <p:sp>
+        <p:nvSpPr>
+          <p:cNvPr id="2" name="Title 1">
+            <a:extLst>
+              <a:ext uri="{FF2B5EF4-FFF2-40B4-BE49-F238E27FC236}">
                 <a16:creationId xmlns:a16="http://schemas.microsoft.com/office/drawing/2014/main" id="{72984080-0615-4066-BE00-87EABB77172B}"/>
               </a:ext>
             </a:extLst>
@@ -13733,7 +14336,7 @@
 </p:sld>
 </file>
 
-<file path=ppt/slides/slide21.xml><?xml version="1.0" encoding="utf-8"?>
+<file path=ppt/slides/slide22.xml><?xml version="1.0" encoding="utf-8"?>
 <p:sld xmlns:a="http://schemas.openxmlformats.org/drawingml/2006/main" xmlns:r="http://schemas.openxmlformats.org/officeDocument/2006/relationships" xmlns:p="http://schemas.openxmlformats.org/presentationml/2006/main" showMasterSp="0">
   <p:cSld>
     <p:bg>
@@ -13827,7 +14430,7 @@
 </p:sld>
 </file>
 
-<file path=ppt/slides/slide22.xml><?xml version="1.0" encoding="utf-8"?>
+<file path=ppt/slides/slide23.xml><?xml version="1.0" encoding="utf-8"?>
 <p:sld xmlns:a="http://schemas.openxmlformats.org/drawingml/2006/main" xmlns:r="http://schemas.openxmlformats.org/officeDocument/2006/relationships" xmlns:p="http://schemas.openxmlformats.org/presentationml/2006/main">
   <p:cSld>
     <p:spTree>
@@ -13925,7 +14528,7 @@
 </p:sld>
 </file>
 
-<file path=ppt/slides/slide23.xml><?xml version="1.0" encoding="utf-8"?>
+<file path=ppt/slides/slide24.xml><?xml version="1.0" encoding="utf-8"?>
 <p:sld xmlns:a="http://schemas.openxmlformats.org/drawingml/2006/main" xmlns:r="http://schemas.openxmlformats.org/officeDocument/2006/relationships" xmlns:p="http://schemas.openxmlformats.org/presentationml/2006/main" showMasterSp="0">
   <p:cSld>
     <p:bg>
@@ -14019,7 +14622,7 @@
 </p:sld>
 </file>
 
-<file path=ppt/slides/slide24.xml><?xml version="1.0" encoding="utf-8"?>
+<file path=ppt/slides/slide25.xml><?xml version="1.0" encoding="utf-8"?>
 <p:sld xmlns:a="http://schemas.openxmlformats.org/drawingml/2006/main" xmlns:r="http://schemas.openxmlformats.org/officeDocument/2006/relationships" xmlns:p="http://schemas.openxmlformats.org/presentationml/2006/main">
   <p:cSld>
     <p:spTree>
@@ -14123,7 +14726,7 @@
 </p:sld>
 </file>
 
-<file path=ppt/slides/slide25.xml><?xml version="1.0" encoding="utf-8"?>
+<file path=ppt/slides/slide26.xml><?xml version="1.0" encoding="utf-8"?>
 <p:sld xmlns:a="http://schemas.openxmlformats.org/drawingml/2006/main" xmlns:r="http://schemas.openxmlformats.org/officeDocument/2006/relationships" xmlns:p="http://schemas.openxmlformats.org/presentationml/2006/main" showMasterSp="0">
   <p:cSld>
     <p:bg>
@@ -14217,7 +14820,7 @@
 </p:sld>
 </file>
 
-<file path=ppt/slides/slide26.xml><?xml version="1.0" encoding="utf-8"?>
+<file path=ppt/slides/slide27.xml><?xml version="1.0" encoding="utf-8"?>
 <p:sld xmlns:a="http://schemas.openxmlformats.org/drawingml/2006/main" xmlns:r="http://schemas.openxmlformats.org/officeDocument/2006/relationships" xmlns:p="http://schemas.openxmlformats.org/presentationml/2006/main">
   <p:cSld>
     <p:spTree>
@@ -14325,7 +14928,7 @@
 </p:sld>
 </file>
 
-<file path=ppt/slides/slide27.xml><?xml version="1.0" encoding="utf-8"?>
+<file path=ppt/slides/slide28.xml><?xml version="1.0" encoding="utf-8"?>
 <p:sld xmlns:a="http://schemas.openxmlformats.org/drawingml/2006/main" xmlns:r="http://schemas.openxmlformats.org/officeDocument/2006/relationships" xmlns:p="http://schemas.openxmlformats.org/presentationml/2006/main" showMasterSp="0">
   <p:cSld>
     <p:bg>
@@ -14419,7 +15022,7 @@
 </p:sld>
 </file>
 
-<file path=ppt/slides/slide28.xml><?xml version="1.0" encoding="utf-8"?>
+<file path=ppt/slides/slide29.xml><?xml version="1.0" encoding="utf-8"?>
 <p:sld xmlns:a="http://schemas.openxmlformats.org/drawingml/2006/main" xmlns:r="http://schemas.openxmlformats.org/officeDocument/2006/relationships" xmlns:p="http://schemas.openxmlformats.org/presentationml/2006/main">
   <p:cSld>
     <p:spTree>
@@ -14528,7 +15131,131 @@
 </p:sld>
 </file>
 
-<file path=ppt/slides/slide29.xml><?xml version="1.0" encoding="utf-8"?>
+<file path=ppt/slides/slide3.xml><?xml version="1.0" encoding="utf-8"?>
+<p:sld xmlns:a="http://schemas.openxmlformats.org/drawingml/2006/main" xmlns:r="http://schemas.openxmlformats.org/officeDocument/2006/relationships" xmlns:p="http://schemas.openxmlformats.org/presentationml/2006/main">
+  <p:cSld>
+    <p:spTree>
+      <p:nvGrpSpPr>
+        <p:cNvPr id="1" name=""/>
+        <p:cNvGrpSpPr/>
+        <p:nvPr/>
+      </p:nvGrpSpPr>
+      <p:grpSpPr>
+        <a:xfrm>
+          <a:off x="0" y="0"/>
+          <a:ext cx="0" cy="0"/>
+          <a:chOff x="0" y="0"/>
+          <a:chExt cx="0" cy="0"/>
+        </a:xfrm>
+      </p:grpSpPr>
+      <p:sp>
+        <p:nvSpPr>
+          <p:cNvPr id="2" name="Title 1">
+            <a:extLst>
+              <a:ext uri="{FF2B5EF4-FFF2-40B4-BE49-F238E27FC236}">
+                <a16:creationId xmlns:a16="http://schemas.microsoft.com/office/drawing/2014/main" id="{72F26327-E63A-4F48-8545-DBB742832E45}"/>
+              </a:ext>
+            </a:extLst>
+          </p:cNvPr>
+          <p:cNvSpPr>
+            <a:spLocks noGrp="1"/>
+          </p:cNvSpPr>
+          <p:nvPr>
+            <p:ph type="title"/>
+          </p:nvPr>
+        </p:nvSpPr>
+        <p:spPr/>
+        <p:txBody>
+          <a:bodyPr/>
+          <a:lstStyle/>
+          <a:p>
+            <a:r>
+              <a:rPr lang="en-US" dirty="0"/>
+              <a:t>Stack – what is a stack?</a:t>
+            </a:r>
+          </a:p>
+        </p:txBody>
+      </p:sp>
+      <p:sp>
+        <p:nvSpPr>
+          <p:cNvPr id="3" name="Content Placeholder 2">
+            <a:extLst>
+              <a:ext uri="{FF2B5EF4-FFF2-40B4-BE49-F238E27FC236}">
+                <a16:creationId xmlns:a16="http://schemas.microsoft.com/office/drawing/2014/main" id="{BC54CD22-85EC-4E48-B538-84350EC33A0D}"/>
+              </a:ext>
+            </a:extLst>
+          </p:cNvPr>
+          <p:cNvSpPr>
+            <a:spLocks noGrp="1"/>
+          </p:cNvSpPr>
+          <p:nvPr>
+            <p:ph idx="1"/>
+          </p:nvPr>
+        </p:nvSpPr>
+        <p:spPr>
+          <a:xfrm>
+            <a:off x="1141412" y="2249487"/>
+            <a:ext cx="9905999" cy="3541714"/>
+          </a:xfrm>
+        </p:spPr>
+        <p:txBody>
+          <a:bodyPr/>
+          <a:lstStyle/>
+          <a:p>
+            <a:r>
+              <a:rPr lang="en-US" dirty="0"/>
+              <a:t>Data is added on top of the stack and removed from the top</a:t>
+            </a:r>
+          </a:p>
+          <a:p>
+            <a:r>
+              <a:rPr lang="en-US" dirty="0"/>
+              <a:t>Used for function parameters and local variables</a:t>
+            </a:r>
+          </a:p>
+          <a:p>
+            <a:r>
+              <a:rPr lang="en-US" dirty="0"/>
+              <a:t>Used for parsing nested expressions</a:t>
+            </a:r>
+          </a:p>
+          <a:p>
+            <a:pPr lvl="1"/>
+            <a:r>
+              <a:rPr lang="en-US" dirty="0"/>
+              <a:t>E.g., 7 * (2 + 3)</a:t>
+            </a:r>
+          </a:p>
+          <a:p>
+            <a:r>
+              <a:rPr lang="en-US" dirty="0"/>
+              <a:t>Used for depth </a:t>
+            </a:r>
+            <a:r>
+              <a:rPr lang="en-US"/>
+              <a:t>first search and </a:t>
+            </a:r>
+            <a:r>
+              <a:rPr lang="en-US" dirty="0"/>
+              <a:t>other algorithms</a:t>
+            </a:r>
+          </a:p>
+        </p:txBody>
+      </p:sp>
+    </p:spTree>
+    <p:extLst>
+      <p:ext uri="{BB962C8B-B14F-4D97-AF65-F5344CB8AC3E}">
+        <p14:creationId xmlns:p14="http://schemas.microsoft.com/office/powerpoint/2010/main" val="3170362305"/>
+      </p:ext>
+    </p:extLst>
+  </p:cSld>
+  <p:clrMapOvr>
+    <a:masterClrMapping/>
+  </p:clrMapOvr>
+</p:sld>
+</file>
+
+<file path=ppt/slides/slide30.xml><?xml version="1.0" encoding="utf-8"?>
 <p:sld xmlns:a="http://schemas.openxmlformats.org/drawingml/2006/main" xmlns:r="http://schemas.openxmlformats.org/officeDocument/2006/relationships" xmlns:p="http://schemas.openxmlformats.org/presentationml/2006/main" showMasterSp="0">
   <p:cSld>
     <p:bg>
@@ -14622,7 +15349,7 @@
 </p:sld>
 </file>
 
-<file path=ppt/slides/slide3.xml><?xml version="1.0" encoding="utf-8"?>
+<file path=ppt/slides/slide31.xml><?xml version="1.0" encoding="utf-8"?>
 <p:sld xmlns:a="http://schemas.openxmlformats.org/drawingml/2006/main" xmlns:r="http://schemas.openxmlformats.org/officeDocument/2006/relationships" xmlns:p="http://schemas.openxmlformats.org/presentationml/2006/main">
   <p:cSld>
     <p:spTree>
@@ -14644,115 +15371,6 @@
           <p:cNvPr id="2" name="Title 1">
             <a:extLst>
               <a:ext uri="{FF2B5EF4-FFF2-40B4-BE49-F238E27FC236}">
-                <a16:creationId xmlns:a16="http://schemas.microsoft.com/office/drawing/2014/main" id="{72F26327-E63A-4F48-8545-DBB742832E45}"/>
-              </a:ext>
-            </a:extLst>
-          </p:cNvPr>
-          <p:cNvSpPr>
-            <a:spLocks noGrp="1"/>
-          </p:cNvSpPr>
-          <p:nvPr>
-            <p:ph type="title"/>
-          </p:nvPr>
-        </p:nvSpPr>
-        <p:spPr/>
-        <p:txBody>
-          <a:bodyPr/>
-          <a:lstStyle/>
-          <a:p>
-            <a:r>
-              <a:rPr lang="en-US" dirty="0"/>
-              <a:t>Stack – what is a stack?</a:t>
-            </a:r>
-          </a:p>
-        </p:txBody>
-      </p:sp>
-      <p:sp>
-        <p:nvSpPr>
-          <p:cNvPr id="3" name="Content Placeholder 2">
-            <a:extLst>
-              <a:ext uri="{FF2B5EF4-FFF2-40B4-BE49-F238E27FC236}">
-                <a16:creationId xmlns:a16="http://schemas.microsoft.com/office/drawing/2014/main" id="{BC54CD22-85EC-4E48-B538-84350EC33A0D}"/>
-              </a:ext>
-            </a:extLst>
-          </p:cNvPr>
-          <p:cNvSpPr>
-            <a:spLocks noGrp="1"/>
-          </p:cNvSpPr>
-          <p:nvPr>
-            <p:ph idx="1"/>
-          </p:nvPr>
-        </p:nvSpPr>
-        <p:spPr>
-          <a:xfrm>
-            <a:off x="1141412" y="2249487"/>
-            <a:ext cx="9905999" cy="3541714"/>
-          </a:xfrm>
-        </p:spPr>
-        <p:txBody>
-          <a:bodyPr/>
-          <a:lstStyle/>
-          <a:p>
-            <a:r>
-              <a:rPr lang="en-US" dirty="0"/>
-              <a:t>Data is added on top of the stack and removed from the top</a:t>
-            </a:r>
-          </a:p>
-          <a:p>
-            <a:r>
-              <a:rPr lang="en-US" dirty="0"/>
-              <a:t>Used for function parameters and local variables</a:t>
-            </a:r>
-          </a:p>
-          <a:p>
-            <a:r>
-              <a:rPr lang="en-US" dirty="0"/>
-              <a:t>Used for parsing nested expression (e.g., with parentheses)</a:t>
-            </a:r>
-          </a:p>
-          <a:p>
-            <a:r>
-              <a:rPr lang="en-US" dirty="0"/>
-              <a:t>Used for depth first search and other algorithms</a:t>
-            </a:r>
-          </a:p>
-        </p:txBody>
-      </p:sp>
-    </p:spTree>
-    <p:extLst>
-      <p:ext uri="{BB962C8B-B14F-4D97-AF65-F5344CB8AC3E}">
-        <p14:creationId xmlns:p14="http://schemas.microsoft.com/office/powerpoint/2010/main" val="3170362305"/>
-      </p:ext>
-    </p:extLst>
-  </p:cSld>
-  <p:clrMapOvr>
-    <a:masterClrMapping/>
-  </p:clrMapOvr>
-</p:sld>
-</file>
-
-<file path=ppt/slides/slide30.xml><?xml version="1.0" encoding="utf-8"?>
-<p:sld xmlns:a="http://schemas.openxmlformats.org/drawingml/2006/main" xmlns:r="http://schemas.openxmlformats.org/officeDocument/2006/relationships" xmlns:p="http://schemas.openxmlformats.org/presentationml/2006/main">
-  <p:cSld>
-    <p:spTree>
-      <p:nvGrpSpPr>
-        <p:cNvPr id="1" name=""/>
-        <p:cNvGrpSpPr/>
-        <p:nvPr/>
-      </p:nvGrpSpPr>
-      <p:grpSpPr>
-        <a:xfrm>
-          <a:off x="0" y="0"/>
-          <a:ext cx="0" cy="0"/>
-          <a:chOff x="0" y="0"/>
-          <a:chExt cx="0" cy="0"/>
-        </a:xfrm>
-      </p:grpSpPr>
-      <p:sp>
-        <p:nvSpPr>
-          <p:cNvPr id="2" name="Title 1">
-            <a:extLst>
-              <a:ext uri="{FF2B5EF4-FFF2-40B4-BE49-F238E27FC236}">
                 <a16:creationId xmlns:a16="http://schemas.microsoft.com/office/drawing/2014/main" id="{B114EB99-79D2-46E1-B13A-DE992CD8062F}"/>
               </a:ext>
             </a:extLst>
@@ -14880,7 +15498,7 @@
 </p:sld>
 </file>
 
-<file path=ppt/slides/slide31.xml><?xml version="1.0" encoding="utf-8"?>
+<file path=ppt/slides/slide32.xml><?xml version="1.0" encoding="utf-8"?>
 <p:sld xmlns:a="http://schemas.openxmlformats.org/drawingml/2006/main" xmlns:r="http://schemas.openxmlformats.org/officeDocument/2006/relationships" xmlns:p="http://schemas.openxmlformats.org/presentationml/2006/main" showMasterSp="0">
   <p:cSld>
     <p:bg>
@@ -14974,110 +15592,6 @@
 </p:sld>
 </file>
 
-<file path=ppt/slides/slide32.xml><?xml version="1.0" encoding="utf-8"?>
-<p:sld xmlns:a="http://schemas.openxmlformats.org/drawingml/2006/main" xmlns:r="http://schemas.openxmlformats.org/officeDocument/2006/relationships" xmlns:p="http://schemas.openxmlformats.org/presentationml/2006/main">
-  <p:cSld>
-    <p:spTree>
-      <p:nvGrpSpPr>
-        <p:cNvPr id="1" name=""/>
-        <p:cNvGrpSpPr/>
-        <p:nvPr/>
-      </p:nvGrpSpPr>
-      <p:grpSpPr>
-        <a:xfrm>
-          <a:off x="0" y="0"/>
-          <a:ext cx="0" cy="0"/>
-          <a:chOff x="0" y="0"/>
-          <a:chExt cx="0" cy="0"/>
-        </a:xfrm>
-      </p:grpSpPr>
-      <p:sp>
-        <p:nvSpPr>
-          <p:cNvPr id="2" name="Title 1">
-            <a:extLst>
-              <a:ext uri="{FF2B5EF4-FFF2-40B4-BE49-F238E27FC236}">
-                <a16:creationId xmlns:a16="http://schemas.microsoft.com/office/drawing/2014/main" id="{BB04782C-1989-4E11-B306-5CA00839A011}"/>
-              </a:ext>
-            </a:extLst>
-          </p:cNvPr>
-          <p:cNvSpPr>
-            <a:spLocks noGrp="1"/>
-          </p:cNvSpPr>
-          <p:nvPr>
-            <p:ph type="title"/>
-          </p:nvPr>
-        </p:nvSpPr>
-        <p:spPr/>
-        <p:txBody>
-          <a:bodyPr/>
-          <a:lstStyle/>
-          <a:p>
-            <a:r>
-              <a:rPr lang="en-US" dirty="0"/>
-              <a:t>Control structures</a:t>
-            </a:r>
-          </a:p>
-        </p:txBody>
-      </p:sp>
-      <p:sp>
-        <p:nvSpPr>
-          <p:cNvPr id="3" name="Content Placeholder 2">
-            <a:extLst>
-              <a:ext uri="{FF2B5EF4-FFF2-40B4-BE49-F238E27FC236}">
-                <a16:creationId xmlns:a16="http://schemas.microsoft.com/office/drawing/2014/main" id="{E1C76D66-B5EB-41A8-A4B9-D752BE40686D}"/>
-              </a:ext>
-            </a:extLst>
-          </p:cNvPr>
-          <p:cNvSpPr>
-            <a:spLocks noGrp="1"/>
-          </p:cNvSpPr>
-          <p:nvPr>
-            <p:ph idx="1"/>
-          </p:nvPr>
-        </p:nvSpPr>
-        <p:spPr/>
-        <p:txBody>
-          <a:bodyPr/>
-          <a:lstStyle/>
-          <a:p>
-            <a:r>
-              <a:rPr lang="en-US" dirty="0"/>
-              <a:t>Must be used inside of a word definition, not in interactive mode</a:t>
-            </a:r>
-          </a:p>
-          <a:p>
-            <a:r>
-              <a:rPr lang="en-US" dirty="0"/>
-              <a:t>IF/ELSE/ENDIF</a:t>
-            </a:r>
-          </a:p>
-          <a:p>
-            <a:r>
-              <a:rPr lang="en-US" dirty="0"/>
-              <a:t>CASE</a:t>
-            </a:r>
-          </a:p>
-          <a:p>
-            <a:r>
-              <a:rPr lang="en-US" dirty="0"/>
-              <a:t>?DO LOOP</a:t>
-            </a:r>
-          </a:p>
-        </p:txBody>
-      </p:sp>
-    </p:spTree>
-    <p:extLst>
-      <p:ext uri="{BB962C8B-B14F-4D97-AF65-F5344CB8AC3E}">
-        <p14:creationId xmlns:p14="http://schemas.microsoft.com/office/powerpoint/2010/main" val="1611645294"/>
-      </p:ext>
-    </p:extLst>
-  </p:cSld>
-  <p:clrMapOvr>
-    <a:masterClrMapping/>
-  </p:clrMapOvr>
-</p:sld>
-</file>
-
 <file path=ppt/slides/slide33.xml><?xml version="1.0" encoding="utf-8"?>
 <p:sld xmlns:a="http://schemas.openxmlformats.org/drawingml/2006/main" xmlns:r="http://schemas.openxmlformats.org/officeDocument/2006/relationships" xmlns:p="http://schemas.openxmlformats.org/presentationml/2006/main">
   <p:cSld>
@@ -15100,6 +15614,110 @@
           <p:cNvPr id="2" name="Title 1">
             <a:extLst>
               <a:ext uri="{FF2B5EF4-FFF2-40B4-BE49-F238E27FC236}">
+                <a16:creationId xmlns:a16="http://schemas.microsoft.com/office/drawing/2014/main" id="{BB04782C-1989-4E11-B306-5CA00839A011}"/>
+              </a:ext>
+            </a:extLst>
+          </p:cNvPr>
+          <p:cNvSpPr>
+            <a:spLocks noGrp="1"/>
+          </p:cNvSpPr>
+          <p:nvPr>
+            <p:ph type="title"/>
+          </p:nvPr>
+        </p:nvSpPr>
+        <p:spPr/>
+        <p:txBody>
+          <a:bodyPr/>
+          <a:lstStyle/>
+          <a:p>
+            <a:r>
+              <a:rPr lang="en-US" dirty="0"/>
+              <a:t>Control structures</a:t>
+            </a:r>
+          </a:p>
+        </p:txBody>
+      </p:sp>
+      <p:sp>
+        <p:nvSpPr>
+          <p:cNvPr id="3" name="Content Placeholder 2">
+            <a:extLst>
+              <a:ext uri="{FF2B5EF4-FFF2-40B4-BE49-F238E27FC236}">
+                <a16:creationId xmlns:a16="http://schemas.microsoft.com/office/drawing/2014/main" id="{E1C76D66-B5EB-41A8-A4B9-D752BE40686D}"/>
+              </a:ext>
+            </a:extLst>
+          </p:cNvPr>
+          <p:cNvSpPr>
+            <a:spLocks noGrp="1"/>
+          </p:cNvSpPr>
+          <p:nvPr>
+            <p:ph idx="1"/>
+          </p:nvPr>
+        </p:nvSpPr>
+        <p:spPr/>
+        <p:txBody>
+          <a:bodyPr/>
+          <a:lstStyle/>
+          <a:p>
+            <a:r>
+              <a:rPr lang="en-US" dirty="0"/>
+              <a:t>Must be used inside of a word definition, not in interactive mode</a:t>
+            </a:r>
+          </a:p>
+          <a:p>
+            <a:r>
+              <a:rPr lang="en-US" dirty="0"/>
+              <a:t>IF/ELSE/ENDIF</a:t>
+            </a:r>
+          </a:p>
+          <a:p>
+            <a:r>
+              <a:rPr lang="en-US" dirty="0"/>
+              <a:t>CASE</a:t>
+            </a:r>
+          </a:p>
+          <a:p>
+            <a:r>
+              <a:rPr lang="en-US" dirty="0"/>
+              <a:t>?DO LOOP</a:t>
+            </a:r>
+          </a:p>
+        </p:txBody>
+      </p:sp>
+    </p:spTree>
+    <p:extLst>
+      <p:ext uri="{BB962C8B-B14F-4D97-AF65-F5344CB8AC3E}">
+        <p14:creationId xmlns:p14="http://schemas.microsoft.com/office/powerpoint/2010/main" val="1611645294"/>
+      </p:ext>
+    </p:extLst>
+  </p:cSld>
+  <p:clrMapOvr>
+    <a:masterClrMapping/>
+  </p:clrMapOvr>
+</p:sld>
+</file>
+
+<file path=ppt/slides/slide34.xml><?xml version="1.0" encoding="utf-8"?>
+<p:sld xmlns:a="http://schemas.openxmlformats.org/drawingml/2006/main" xmlns:r="http://schemas.openxmlformats.org/officeDocument/2006/relationships" xmlns:p="http://schemas.openxmlformats.org/presentationml/2006/main">
+  <p:cSld>
+    <p:spTree>
+      <p:nvGrpSpPr>
+        <p:cNvPr id="1" name=""/>
+        <p:cNvGrpSpPr/>
+        <p:nvPr/>
+      </p:nvGrpSpPr>
+      <p:grpSpPr>
+        <a:xfrm>
+          <a:off x="0" y="0"/>
+          <a:ext cx="0" cy="0"/>
+          <a:chOff x="0" y="0"/>
+          <a:chExt cx="0" cy="0"/>
+        </a:xfrm>
+      </p:grpSpPr>
+      <p:sp>
+        <p:nvSpPr>
+          <p:cNvPr id="2" name="Title 1">
+            <a:extLst>
+              <a:ext uri="{FF2B5EF4-FFF2-40B4-BE49-F238E27FC236}">
                 <a16:creationId xmlns:a16="http://schemas.microsoft.com/office/drawing/2014/main" id="{0D1A5016-65A3-485C-B543-AA38286F998D}"/>
               </a:ext>
             </a:extLst>
@@ -15142,7 +15760,7 @@
         <p:spPr/>
         <p:txBody>
           <a:bodyPr>
-            <a:normAutofit fontScale="92500" lnSpcReduction="10000"/>
+            <a:normAutofit/>
           </a:bodyPr>
           <a:lstStyle/>
           <a:p>
@@ -15159,11 +15777,27 @@
             </a:r>
             <a:r>
               <a:rPr lang="en-US" i="1" dirty="0"/>
+              <a:t>( )</a:t>
+            </a:r>
+            <a:r>
+              <a:rPr lang="en-US" dirty="0"/>
+              <a:t> </a:t>
+            </a:r>
+            <a:r>
+              <a:rPr lang="en-US" i="1" dirty="0"/>
               <a:t>true-code </a:t>
             </a:r>
             <a:r>
               <a:rPr lang="en-US" dirty="0"/>
               <a:t>ELSE </a:t>
+            </a:r>
+            <a:r>
+              <a:rPr lang="en-US" i="1" dirty="0"/>
+              <a:t>( )</a:t>
+            </a:r>
+            <a:r>
+              <a:rPr lang="en-US" dirty="0"/>
+              <a:t> </a:t>
             </a:r>
             <a:r>
               <a:rPr lang="en-US" i="1" dirty="0"/>
@@ -15178,57 +15812,6 @@
             <a:pPr marL="0" indent="0">
               <a:buNone/>
             </a:pPr>
-            <a:r>
-              <a:rPr lang="en-US" dirty="0"/>
-              <a:t>E.g.,</a:t>
-            </a:r>
-          </a:p>
-          <a:p>
-            <a:pPr marL="0" indent="0">
-              <a:buNone/>
-            </a:pPr>
-            <a:r>
-              <a:rPr lang="en-US" dirty="0"/>
-              <a:t>	1 2 &lt;&gt; IF</a:t>
-            </a:r>
-          </a:p>
-          <a:p>
-            <a:pPr marL="0" indent="0">
-              <a:buNone/>
-            </a:pPr>
-            <a:r>
-              <a:rPr lang="en-US" dirty="0"/>
-              <a:t>		.” All is well.” CR</a:t>
-            </a:r>
-          </a:p>
-          <a:p>
-            <a:pPr marL="0" indent="0">
-              <a:buNone/>
-            </a:pPr>
-            <a:r>
-              <a:rPr lang="en-US" dirty="0"/>
-              <a:t>	ELSE</a:t>
-            </a:r>
-          </a:p>
-          <a:p>
-            <a:pPr marL="0" indent="0">
-              <a:buNone/>
-            </a:pPr>
-            <a:r>
-              <a:rPr lang="en-US" dirty="0"/>
-              <a:t>		.” The universe is broken!” CR</a:t>
-            </a:r>
-          </a:p>
-          <a:p>
-            <a:pPr marL="0" indent="0">
-              <a:buNone/>
-            </a:pPr>
-            <a:r>
-              <a:rPr lang="en-US" dirty="0"/>
-              <a:t>	ENDIF</a:t>
-            </a:r>
-          </a:p>
-          <a:p>
             <a:endParaRPr lang="en-US" dirty="0"/>
           </a:p>
         </p:txBody>
@@ -15246,7 +15829,7 @@
 </p:sld>
 </file>
 
-<file path=ppt/slides/slide34.xml><?xml version="1.0" encoding="utf-8"?>
+<file path=ppt/slides/slide35.xml><?xml version="1.0" encoding="utf-8"?>
 <p:sld xmlns:a="http://schemas.openxmlformats.org/drawingml/2006/main" xmlns:r="http://schemas.openxmlformats.org/officeDocument/2006/relationships" xmlns:p="http://schemas.openxmlformats.org/presentationml/2006/main" showMasterSp="0">
   <p:cSld>
     <p:bg>
@@ -15340,7 +15923,7 @@
 </p:sld>
 </file>
 
-<file path=ppt/slides/slide35.xml><?xml version="1.0" encoding="utf-8"?>
+<file path=ppt/slides/slide36.xml><?xml version="1.0" encoding="utf-8"?>
 <p:sld xmlns:a="http://schemas.openxmlformats.org/drawingml/2006/main" xmlns:r="http://schemas.openxmlformats.org/officeDocument/2006/relationships" xmlns:p="http://schemas.openxmlformats.org/presentationml/2006/main">
   <p:cSld>
     <p:spTree>
@@ -15424,7 +16007,23 @@
             </a:pPr>
             <a:r>
               <a:rPr lang="en-US" dirty="0"/>
-              <a:t>	value-1 OF code-for-case 1 ENDOF</a:t>
+              <a:t>	</a:t>
+            </a:r>
+            <a:r>
+              <a:rPr lang="en-US" i="1" dirty="0"/>
+              <a:t>value-1</a:t>
+            </a:r>
+            <a:r>
+              <a:rPr lang="en-US" dirty="0"/>
+              <a:t> OF </a:t>
+            </a:r>
+            <a:r>
+              <a:rPr lang="en-US" i="1" dirty="0"/>
+              <a:t>code-for-case-1</a:t>
+            </a:r>
+            <a:r>
+              <a:rPr lang="en-US" dirty="0"/>
+              <a:t> ENDOF</a:t>
             </a:r>
           </a:p>
           <a:p>
@@ -15442,7 +16041,23 @@
             </a:pPr>
             <a:r>
               <a:rPr lang="en-US" dirty="0"/>
-              <a:t>	value-n OF code-for-case-n ENDOF</a:t>
+              <a:t>	</a:t>
+            </a:r>
+            <a:r>
+              <a:rPr lang="en-US" i="1" dirty="0"/>
+              <a:t>value-n</a:t>
+            </a:r>
+            <a:r>
+              <a:rPr lang="en-US" dirty="0"/>
+              <a:t> OF </a:t>
+            </a:r>
+            <a:r>
+              <a:rPr lang="en-US" i="1" dirty="0"/>
+              <a:t>code-for-case-n</a:t>
+            </a:r>
+            <a:r>
+              <a:rPr lang="en-US" dirty="0"/>
+              <a:t> ENDOF</a:t>
             </a:r>
           </a:p>
           <a:p>
@@ -15451,7 +16066,15 @@
             </a:pPr>
             <a:r>
               <a:rPr lang="en-US" dirty="0"/>
-              <a:t>	( x ) code-for-default-case ( x )        \ Must leave x on the stack!!!</a:t>
+              <a:t>	</a:t>
+            </a:r>
+            <a:r>
+              <a:rPr lang="en-US" i="1" dirty="0"/>
+              <a:t>( x ) code-for-default-case ( x )        </a:t>
+            </a:r>
+            <a:r>
+              <a:rPr lang="en-US" dirty="0"/>
+              <a:t>\ Must leave x on the stack!!!</a:t>
             </a:r>
           </a:p>
           <a:p>
@@ -15478,7 +16101,7 @@
 </p:sld>
 </file>
 
-<file path=ppt/slides/slide36.xml><?xml version="1.0" encoding="utf-8"?>
+<file path=ppt/slides/slide37.xml><?xml version="1.0" encoding="utf-8"?>
 <p:sld xmlns:a="http://schemas.openxmlformats.org/drawingml/2006/main" xmlns:r="http://schemas.openxmlformats.org/officeDocument/2006/relationships" xmlns:p="http://schemas.openxmlformats.org/presentationml/2006/main" showMasterSp="0">
   <p:cSld>
     <p:bg>
@@ -15572,7 +16195,7 @@
 </p:sld>
 </file>
 
-<file path=ppt/slides/slide37.xml><?xml version="1.0" encoding="utf-8"?>
+<file path=ppt/slides/slide38.xml><?xml version="1.0" encoding="utf-8"?>
 <p:sld xmlns:a="http://schemas.openxmlformats.org/drawingml/2006/main" xmlns:r="http://schemas.openxmlformats.org/officeDocument/2006/relationships" xmlns:p="http://schemas.openxmlformats.org/presentationml/2006/main">
   <p:cSld>
     <p:spTree>
@@ -15683,7 +16306,7 @@
 </p:sld>
 </file>
 
-<file path=ppt/slides/slide38.xml><?xml version="1.0" encoding="utf-8"?>
+<file path=ppt/slides/slide39.xml><?xml version="1.0" encoding="utf-8"?>
 <p:sld xmlns:a="http://schemas.openxmlformats.org/drawingml/2006/main" xmlns:r="http://schemas.openxmlformats.org/officeDocument/2006/relationships" xmlns:p="http://schemas.openxmlformats.org/presentationml/2006/main" showMasterSp="0">
   <p:cSld>
     <p:bg>
@@ -15777,156 +16400,6 @@
 </p:sld>
 </file>
 
-<file path=ppt/slides/slide39.xml><?xml version="1.0" encoding="utf-8"?>
-<p:sld xmlns:a="http://schemas.openxmlformats.org/drawingml/2006/main" xmlns:r="http://schemas.openxmlformats.org/officeDocument/2006/relationships" xmlns:p="http://schemas.openxmlformats.org/presentationml/2006/main">
-  <p:cSld>
-    <p:spTree>
-      <p:nvGrpSpPr>
-        <p:cNvPr id="1" name=""/>
-        <p:cNvGrpSpPr/>
-        <p:nvPr/>
-      </p:nvGrpSpPr>
-      <p:grpSpPr>
-        <a:xfrm>
-          <a:off x="0" y="0"/>
-          <a:ext cx="0" cy="0"/>
-          <a:chOff x="0" y="0"/>
-          <a:chExt cx="0" cy="0"/>
-        </a:xfrm>
-      </p:grpSpPr>
-      <p:sp>
-        <p:nvSpPr>
-          <p:cNvPr id="2" name="Title 1">
-            <a:extLst>
-              <a:ext uri="{FF2B5EF4-FFF2-40B4-BE49-F238E27FC236}">
-                <a16:creationId xmlns:a16="http://schemas.microsoft.com/office/drawing/2014/main" id="{889E2E0C-B19B-4173-9024-32F3E0287966}"/>
-              </a:ext>
-            </a:extLst>
-          </p:cNvPr>
-          <p:cNvSpPr>
-            <a:spLocks noGrp="1"/>
-          </p:cNvSpPr>
-          <p:nvPr>
-            <p:ph type="title"/>
-          </p:nvPr>
-        </p:nvSpPr>
-        <p:spPr/>
-        <p:txBody>
-          <a:bodyPr/>
-          <a:lstStyle/>
-          <a:p>
-            <a:r>
-              <a:rPr lang="en-US" dirty="0"/>
-              <a:t>Variables</a:t>
-            </a:r>
-          </a:p>
-        </p:txBody>
-      </p:sp>
-      <p:sp>
-        <p:nvSpPr>
-          <p:cNvPr id="3" name="Content Placeholder 2">
-            <a:extLst>
-              <a:ext uri="{FF2B5EF4-FFF2-40B4-BE49-F238E27FC236}">
-                <a16:creationId xmlns:a16="http://schemas.microsoft.com/office/drawing/2014/main" id="{C0B8B23C-40C6-48E0-A05D-91EB0BE16812}"/>
-              </a:ext>
-            </a:extLst>
-          </p:cNvPr>
-          <p:cNvSpPr>
-            <a:spLocks noGrp="1"/>
-          </p:cNvSpPr>
-          <p:nvPr>
-            <p:ph idx="1"/>
-          </p:nvPr>
-        </p:nvSpPr>
-        <p:spPr/>
-        <p:txBody>
-          <a:bodyPr/>
-          <a:lstStyle/>
-          <a:p>
-            <a:r>
-              <a:rPr lang="en-US" dirty="0"/>
-              <a:t>variable </a:t>
-            </a:r>
-            <a:r>
-              <a:rPr lang="en-US" i="1" dirty="0" err="1"/>
-              <a:t>var</a:t>
-            </a:r>
-            <a:r>
-              <a:rPr lang="en-US" i="1" dirty="0"/>
-              <a:t>-name</a:t>
-            </a:r>
-            <a:r>
-              <a:rPr lang="en-US" dirty="0"/>
-              <a:t> – declare variable</a:t>
-            </a:r>
-          </a:p>
-          <a:p>
-            <a:r>
-              <a:rPr lang="en-US" dirty="0" err="1"/>
-              <a:t>var</a:t>
-            </a:r>
-            <a:r>
-              <a:rPr lang="en-US" dirty="0"/>
-              <a:t>-name is now a word that puts the address of the variable on the stack</a:t>
-            </a:r>
-          </a:p>
-          <a:p>
-            <a:r>
-              <a:rPr lang="en-US" dirty="0"/>
-              <a:t>@ ( </a:t>
-            </a:r>
-            <a:r>
-              <a:rPr lang="en-US" dirty="0" err="1"/>
-              <a:t>addr</a:t>
-            </a:r>
-            <a:r>
-              <a:rPr lang="en-US" dirty="0"/>
-              <a:t> – n ) - puts contents of variable on the stack</a:t>
-            </a:r>
-          </a:p>
-          <a:p>
-            <a:r>
-              <a:rPr lang="en-US" dirty="0"/>
-              <a:t>! ( value </a:t>
-            </a:r>
-            <a:r>
-              <a:rPr lang="en-US" dirty="0" err="1"/>
-              <a:t>addr</a:t>
-            </a:r>
-            <a:r>
-              <a:rPr lang="en-US" dirty="0"/>
-              <a:t> -- ) – stores value in variable</a:t>
-            </a:r>
-          </a:p>
-          <a:p>
-            <a:r>
-              <a:rPr lang="en-US" dirty="0"/>
-              <a:t>? ( </a:t>
-            </a:r>
-            <a:r>
-              <a:rPr lang="en-US" dirty="0" err="1"/>
-              <a:t>addr</a:t>
-            </a:r>
-            <a:r>
-              <a:rPr lang="en-US" dirty="0"/>
-              <a:t> -- ) – outputs variable directly (equivalent to @ . )</a:t>
-            </a:r>
-          </a:p>
-        </p:txBody>
-      </p:sp>
-    </p:spTree>
-    <p:extLst>
-      <p:ext uri="{BB962C8B-B14F-4D97-AF65-F5344CB8AC3E}">
-        <p14:creationId xmlns:p14="http://schemas.microsoft.com/office/powerpoint/2010/main" val="4157543649"/>
-      </p:ext>
-    </p:extLst>
-  </p:cSld>
-  <p:clrMapOvr>
-    <a:masterClrMapping/>
-  </p:clrMapOvr>
-</p:sld>
-</file>
-
 <file path=ppt/slides/slide4.xml><?xml version="1.0" encoding="utf-8"?>
 <p:sld xmlns:a="http://schemas.openxmlformats.org/drawingml/2006/main" xmlns:r="http://schemas.openxmlformats.org/officeDocument/2006/relationships" xmlns:p="http://schemas.openxmlformats.org/presentationml/2006/main">
   <p:cSld>
@@ -16050,6 +16523,156 @@
 </file>
 
 <file path=ppt/slides/slide40.xml><?xml version="1.0" encoding="utf-8"?>
+<p:sld xmlns:a="http://schemas.openxmlformats.org/drawingml/2006/main" xmlns:r="http://schemas.openxmlformats.org/officeDocument/2006/relationships" xmlns:p="http://schemas.openxmlformats.org/presentationml/2006/main">
+  <p:cSld>
+    <p:spTree>
+      <p:nvGrpSpPr>
+        <p:cNvPr id="1" name=""/>
+        <p:cNvGrpSpPr/>
+        <p:nvPr/>
+      </p:nvGrpSpPr>
+      <p:grpSpPr>
+        <a:xfrm>
+          <a:off x="0" y="0"/>
+          <a:ext cx="0" cy="0"/>
+          <a:chOff x="0" y="0"/>
+          <a:chExt cx="0" cy="0"/>
+        </a:xfrm>
+      </p:grpSpPr>
+      <p:sp>
+        <p:nvSpPr>
+          <p:cNvPr id="2" name="Title 1">
+            <a:extLst>
+              <a:ext uri="{FF2B5EF4-FFF2-40B4-BE49-F238E27FC236}">
+                <a16:creationId xmlns:a16="http://schemas.microsoft.com/office/drawing/2014/main" id="{889E2E0C-B19B-4173-9024-32F3E0287966}"/>
+              </a:ext>
+            </a:extLst>
+          </p:cNvPr>
+          <p:cNvSpPr>
+            <a:spLocks noGrp="1"/>
+          </p:cNvSpPr>
+          <p:nvPr>
+            <p:ph type="title"/>
+          </p:nvPr>
+        </p:nvSpPr>
+        <p:spPr/>
+        <p:txBody>
+          <a:bodyPr/>
+          <a:lstStyle/>
+          <a:p>
+            <a:r>
+              <a:rPr lang="en-US" dirty="0"/>
+              <a:t>Variables</a:t>
+            </a:r>
+          </a:p>
+        </p:txBody>
+      </p:sp>
+      <p:sp>
+        <p:nvSpPr>
+          <p:cNvPr id="3" name="Content Placeholder 2">
+            <a:extLst>
+              <a:ext uri="{FF2B5EF4-FFF2-40B4-BE49-F238E27FC236}">
+                <a16:creationId xmlns:a16="http://schemas.microsoft.com/office/drawing/2014/main" id="{C0B8B23C-40C6-48E0-A05D-91EB0BE16812}"/>
+              </a:ext>
+            </a:extLst>
+          </p:cNvPr>
+          <p:cNvSpPr>
+            <a:spLocks noGrp="1"/>
+          </p:cNvSpPr>
+          <p:nvPr>
+            <p:ph idx="1"/>
+          </p:nvPr>
+        </p:nvSpPr>
+        <p:spPr/>
+        <p:txBody>
+          <a:bodyPr/>
+          <a:lstStyle/>
+          <a:p>
+            <a:r>
+              <a:rPr lang="en-US" dirty="0"/>
+              <a:t>variable </a:t>
+            </a:r>
+            <a:r>
+              <a:rPr lang="en-US" i="1" dirty="0" err="1"/>
+              <a:t>var</a:t>
+            </a:r>
+            <a:r>
+              <a:rPr lang="en-US" i="1" dirty="0"/>
+              <a:t>-name</a:t>
+            </a:r>
+            <a:r>
+              <a:rPr lang="en-US" dirty="0"/>
+              <a:t> – declare variable</a:t>
+            </a:r>
+          </a:p>
+          <a:p>
+            <a:r>
+              <a:rPr lang="en-US" dirty="0" err="1"/>
+              <a:t>var</a:t>
+            </a:r>
+            <a:r>
+              <a:rPr lang="en-US" dirty="0"/>
+              <a:t>-name is now a word that puts the address of the variable on the stack</a:t>
+            </a:r>
+          </a:p>
+          <a:p>
+            <a:r>
+              <a:rPr lang="en-US" dirty="0"/>
+              <a:t>@ ( </a:t>
+            </a:r>
+            <a:r>
+              <a:rPr lang="en-US" dirty="0" err="1"/>
+              <a:t>addr</a:t>
+            </a:r>
+            <a:r>
+              <a:rPr lang="en-US" dirty="0"/>
+              <a:t> – n ) - puts contents of variable on the stack</a:t>
+            </a:r>
+          </a:p>
+          <a:p>
+            <a:r>
+              <a:rPr lang="en-US" dirty="0"/>
+              <a:t>! ( value </a:t>
+            </a:r>
+            <a:r>
+              <a:rPr lang="en-US" dirty="0" err="1"/>
+              <a:t>addr</a:t>
+            </a:r>
+            <a:r>
+              <a:rPr lang="en-US" dirty="0"/>
+              <a:t> -- ) – stores value in variable</a:t>
+            </a:r>
+          </a:p>
+          <a:p>
+            <a:r>
+              <a:rPr lang="en-US" dirty="0"/>
+              <a:t>? ( </a:t>
+            </a:r>
+            <a:r>
+              <a:rPr lang="en-US" dirty="0" err="1"/>
+              <a:t>addr</a:t>
+            </a:r>
+            <a:r>
+              <a:rPr lang="en-US" dirty="0"/>
+              <a:t> -- ) – outputs variable directly (equivalent to @ . )</a:t>
+            </a:r>
+          </a:p>
+        </p:txBody>
+      </p:sp>
+    </p:spTree>
+    <p:extLst>
+      <p:ext uri="{BB962C8B-B14F-4D97-AF65-F5344CB8AC3E}">
+        <p14:creationId xmlns:p14="http://schemas.microsoft.com/office/powerpoint/2010/main" val="4157543649"/>
+      </p:ext>
+    </p:extLst>
+  </p:cSld>
+  <p:clrMapOvr>
+    <a:masterClrMapping/>
+  </p:clrMapOvr>
+</p:sld>
+</file>
+
+<file path=ppt/slides/slide41.xml><?xml version="1.0" encoding="utf-8"?>
 <p:sld xmlns:a="http://schemas.openxmlformats.org/drawingml/2006/main" xmlns:r="http://schemas.openxmlformats.org/officeDocument/2006/relationships" xmlns:p="http://schemas.openxmlformats.org/presentationml/2006/main" showMasterSp="0">
   <p:cSld>
     <p:bg>
@@ -16143,7 +16766,7 @@
 </p:sld>
 </file>
 
-<file path=ppt/slides/slide41.xml><?xml version="1.0" encoding="utf-8"?>
+<file path=ppt/slides/slide42.xml><?xml version="1.0" encoding="utf-8"?>
 <p:sld xmlns:a="http://schemas.openxmlformats.org/drawingml/2006/main" xmlns:r="http://schemas.openxmlformats.org/officeDocument/2006/relationships" xmlns:p="http://schemas.openxmlformats.org/presentationml/2006/main">
   <p:cSld>
     <p:spTree>
@@ -16275,7 +16898,7 @@
 </p:sld>
 </file>
 
-<file path=ppt/slides/slide42.xml><?xml version="1.0" encoding="utf-8"?>
+<file path=ppt/slides/slide43.xml><?xml version="1.0" encoding="utf-8"?>
 <p:sld xmlns:a="http://schemas.openxmlformats.org/drawingml/2006/main" xmlns:r="http://schemas.openxmlformats.org/officeDocument/2006/relationships" xmlns:p="http://schemas.openxmlformats.org/presentationml/2006/main" showMasterSp="0">
   <p:cSld>
     <p:bg>
@@ -16369,130 +16992,6 @@
 </p:sld>
 </file>
 
-<file path=ppt/slides/slide43.xml><?xml version="1.0" encoding="utf-8"?>
-<p:sld xmlns:a="http://schemas.openxmlformats.org/drawingml/2006/main" xmlns:r="http://schemas.openxmlformats.org/officeDocument/2006/relationships" xmlns:p="http://schemas.openxmlformats.org/presentationml/2006/main">
-  <p:cSld>
-    <p:spTree>
-      <p:nvGrpSpPr>
-        <p:cNvPr id="1" name=""/>
-        <p:cNvGrpSpPr/>
-        <p:nvPr/>
-      </p:nvGrpSpPr>
-      <p:grpSpPr>
-        <a:xfrm>
-          <a:off x="0" y="0"/>
-          <a:ext cx="0" cy="0"/>
-          <a:chOff x="0" y="0"/>
-          <a:chExt cx="0" cy="0"/>
-        </a:xfrm>
-      </p:grpSpPr>
-      <p:sp>
-        <p:nvSpPr>
-          <p:cNvPr id="2" name="Title 1">
-            <a:extLst>
-              <a:ext uri="{FF2B5EF4-FFF2-40B4-BE49-F238E27FC236}">
-                <a16:creationId xmlns:a16="http://schemas.microsoft.com/office/drawing/2014/main" id="{B553059F-EC42-452F-B842-9C2F2CFDFE02}"/>
-              </a:ext>
-            </a:extLst>
-          </p:cNvPr>
-          <p:cNvSpPr>
-            <a:spLocks noGrp="1"/>
-          </p:cNvSpPr>
-          <p:nvPr>
-            <p:ph type="title"/>
-          </p:nvPr>
-        </p:nvSpPr>
-        <p:spPr/>
-        <p:txBody>
-          <a:bodyPr/>
-          <a:lstStyle/>
-          <a:p>
-            <a:r>
-              <a:rPr lang="en-US" dirty="0"/>
-              <a:t>ESP8266 System-on-a-chip</a:t>
-            </a:r>
-          </a:p>
-        </p:txBody>
-      </p:sp>
-      <p:sp>
-        <p:nvSpPr>
-          <p:cNvPr id="3" name="Content Placeholder 2">
-            <a:extLst>
-              <a:ext uri="{FF2B5EF4-FFF2-40B4-BE49-F238E27FC236}">
-                <a16:creationId xmlns:a16="http://schemas.microsoft.com/office/drawing/2014/main" id="{2784885E-5D20-4AD0-AA60-560211B440B9}"/>
-              </a:ext>
-            </a:extLst>
-          </p:cNvPr>
-          <p:cNvSpPr>
-            <a:spLocks noGrp="1"/>
-          </p:cNvSpPr>
-          <p:nvPr>
-            <p:ph idx="1"/>
-          </p:nvPr>
-        </p:nvSpPr>
-        <p:spPr/>
-        <p:txBody>
-          <a:bodyPr/>
-          <a:lstStyle/>
-          <a:p>
-            <a:r>
-              <a:rPr lang="en-US" dirty="0"/>
-              <a:t>80 MHz RISC CPU</a:t>
-            </a:r>
-          </a:p>
-          <a:p>
-            <a:r>
-              <a:rPr lang="en-US" dirty="0"/>
-              <a:t>32 KiB instruction RAM</a:t>
-            </a:r>
-          </a:p>
-          <a:p>
-            <a:r>
-              <a:rPr lang="en-US" dirty="0"/>
-              <a:t>80 KiB user-data RAM</a:t>
-            </a:r>
-          </a:p>
-          <a:p>
-            <a:r>
-              <a:rPr lang="en-US" dirty="0"/>
-              <a:t>Up to 16 </a:t>
-            </a:r>
-            <a:r>
-              <a:rPr lang="en-US" dirty="0" err="1"/>
-              <a:t>MiB</a:t>
-            </a:r>
-            <a:r>
-              <a:rPr lang="en-US" dirty="0"/>
-              <a:t> flash</a:t>
-            </a:r>
-          </a:p>
-          <a:p>
-            <a:r>
-              <a:rPr lang="en-US" dirty="0"/>
-              <a:t>16 GPIO pins</a:t>
-            </a:r>
-          </a:p>
-          <a:p>
-            <a:r>
-              <a:rPr lang="en-US" dirty="0"/>
-              <a:t>Wi-Fi capable (802.11 b/g/n)!</a:t>
-            </a:r>
-          </a:p>
-        </p:txBody>
-      </p:sp>
-    </p:spTree>
-    <p:extLst>
-      <p:ext uri="{BB962C8B-B14F-4D97-AF65-F5344CB8AC3E}">
-        <p14:creationId xmlns:p14="http://schemas.microsoft.com/office/powerpoint/2010/main" val="128709044"/>
-      </p:ext>
-    </p:extLst>
-  </p:cSld>
-  <p:clrMapOvr>
-    <a:masterClrMapping/>
-  </p:clrMapOvr>
-</p:sld>
-</file>
-
 <file path=ppt/slides/slide44.xml><?xml version="1.0" encoding="utf-8"?>
 <p:sld xmlns:a="http://schemas.openxmlformats.org/drawingml/2006/main" xmlns:r="http://schemas.openxmlformats.org/officeDocument/2006/relationships" xmlns:p="http://schemas.openxmlformats.org/presentationml/2006/main">
   <p:cSld>
@@ -16613,7 +17112,7 @@
           <p:cNvPr id="2" name="Title 1">
             <a:extLst>
               <a:ext uri="{FF2B5EF4-FFF2-40B4-BE49-F238E27FC236}">
-                <a16:creationId xmlns:a16="http://schemas.microsoft.com/office/drawing/2014/main" id="{0D3B85E4-7936-442E-8658-EAFCCCE80859}"/>
+                <a16:creationId xmlns:a16="http://schemas.microsoft.com/office/drawing/2014/main" id="{B553059F-EC42-452F-B842-9C2F2CFDFE02}"/>
               </a:ext>
             </a:extLst>
           </p:cNvPr>
@@ -16631,7 +17130,7 @@
           <a:p>
             <a:r>
               <a:rPr lang="en-US" dirty="0"/>
-              <a:t>DEMO(S)?</a:t>
+              <a:t>ESP8266 System-on-a-chip</a:t>
             </a:r>
           </a:p>
         </p:txBody>
@@ -16641,7 +17140,7 @@
           <p:cNvPr id="3" name="Content Placeholder 2">
             <a:extLst>
               <a:ext uri="{FF2B5EF4-FFF2-40B4-BE49-F238E27FC236}">
-                <a16:creationId xmlns:a16="http://schemas.microsoft.com/office/drawing/2014/main" id="{E4D96236-B2C7-485A-8943-557BCC0A042A}"/>
+                <a16:creationId xmlns:a16="http://schemas.microsoft.com/office/drawing/2014/main" id="{2784885E-5D20-4AD0-AA60-560211B440B9}"/>
               </a:ext>
             </a:extLst>
           </p:cNvPr>
@@ -16659,13 +17158,45 @@
           <a:p>
             <a:r>
               <a:rPr lang="en-US" dirty="0"/>
-              <a:t>Morse code</a:t>
-            </a:r>
-          </a:p>
-          <a:p>
-            <a:r>
-              <a:rPr lang="en-US" dirty="0"/>
-              <a:t>Music program</a:t>
+              <a:t>80 MHz RISC CPU</a:t>
+            </a:r>
+          </a:p>
+          <a:p>
+            <a:r>
+              <a:rPr lang="en-US" dirty="0"/>
+              <a:t>32 KiB instruction RAM</a:t>
+            </a:r>
+          </a:p>
+          <a:p>
+            <a:r>
+              <a:rPr lang="en-US" dirty="0"/>
+              <a:t>80 KiB user-data RAM</a:t>
+            </a:r>
+          </a:p>
+          <a:p>
+            <a:r>
+              <a:rPr lang="en-US" dirty="0"/>
+              <a:t>Up to 16 </a:t>
+            </a:r>
+            <a:r>
+              <a:rPr lang="en-US" dirty="0" err="1"/>
+              <a:t>MiB</a:t>
+            </a:r>
+            <a:r>
+              <a:rPr lang="en-US" dirty="0"/>
+              <a:t> flash</a:t>
+            </a:r>
+          </a:p>
+          <a:p>
+            <a:r>
+              <a:rPr lang="en-US" dirty="0"/>
+              <a:t>16 GPIO pins</a:t>
+            </a:r>
+          </a:p>
+          <a:p>
+            <a:r>
+              <a:rPr lang="en-US" dirty="0"/>
+              <a:t>Wi-Fi capable (802.11 b/g/n)!</a:t>
             </a:r>
           </a:p>
         </p:txBody>
@@ -16673,7 +17204,7 @@
     </p:spTree>
     <p:extLst>
       <p:ext uri="{BB962C8B-B14F-4D97-AF65-F5344CB8AC3E}">
-        <p14:creationId xmlns:p14="http://schemas.microsoft.com/office/powerpoint/2010/main" val="821682850"/>
+        <p14:creationId xmlns:p14="http://schemas.microsoft.com/office/powerpoint/2010/main" val="128709044"/>
       </p:ext>
     </p:extLst>
   </p:cSld>
@@ -16705,6 +17236,98 @@
           <p:cNvPr id="2" name="Title 1">
             <a:extLst>
               <a:ext uri="{FF2B5EF4-FFF2-40B4-BE49-F238E27FC236}">
+                <a16:creationId xmlns:a16="http://schemas.microsoft.com/office/drawing/2014/main" id="{0D3B85E4-7936-442E-8658-EAFCCCE80859}"/>
+              </a:ext>
+            </a:extLst>
+          </p:cNvPr>
+          <p:cNvSpPr>
+            <a:spLocks noGrp="1"/>
+          </p:cNvSpPr>
+          <p:nvPr>
+            <p:ph type="title"/>
+          </p:nvPr>
+        </p:nvSpPr>
+        <p:spPr/>
+        <p:txBody>
+          <a:bodyPr/>
+          <a:lstStyle/>
+          <a:p>
+            <a:r>
+              <a:rPr lang="en-US" dirty="0"/>
+              <a:t>DEMO(S)?</a:t>
+            </a:r>
+          </a:p>
+        </p:txBody>
+      </p:sp>
+      <p:sp>
+        <p:nvSpPr>
+          <p:cNvPr id="3" name="Content Placeholder 2">
+            <a:extLst>
+              <a:ext uri="{FF2B5EF4-FFF2-40B4-BE49-F238E27FC236}">
+                <a16:creationId xmlns:a16="http://schemas.microsoft.com/office/drawing/2014/main" id="{E4D96236-B2C7-485A-8943-557BCC0A042A}"/>
+              </a:ext>
+            </a:extLst>
+          </p:cNvPr>
+          <p:cNvSpPr>
+            <a:spLocks noGrp="1"/>
+          </p:cNvSpPr>
+          <p:nvPr>
+            <p:ph idx="1"/>
+          </p:nvPr>
+        </p:nvSpPr>
+        <p:spPr/>
+        <p:txBody>
+          <a:bodyPr/>
+          <a:lstStyle/>
+          <a:p>
+            <a:r>
+              <a:rPr lang="en-US" dirty="0"/>
+              <a:t>Morse code</a:t>
+            </a:r>
+          </a:p>
+          <a:p>
+            <a:r>
+              <a:rPr lang="en-US" dirty="0"/>
+              <a:t>Music program</a:t>
+            </a:r>
+          </a:p>
+        </p:txBody>
+      </p:sp>
+    </p:spTree>
+    <p:extLst>
+      <p:ext uri="{BB962C8B-B14F-4D97-AF65-F5344CB8AC3E}">
+        <p14:creationId xmlns:p14="http://schemas.microsoft.com/office/powerpoint/2010/main" val="821682850"/>
+      </p:ext>
+    </p:extLst>
+  </p:cSld>
+  <p:clrMapOvr>
+    <a:masterClrMapping/>
+  </p:clrMapOvr>
+</p:sld>
+</file>
+
+<file path=ppt/slides/slide47.xml><?xml version="1.0" encoding="utf-8"?>
+<p:sld xmlns:a="http://schemas.openxmlformats.org/drawingml/2006/main" xmlns:r="http://schemas.openxmlformats.org/officeDocument/2006/relationships" xmlns:p="http://schemas.openxmlformats.org/presentationml/2006/main">
+  <p:cSld>
+    <p:spTree>
+      <p:nvGrpSpPr>
+        <p:cNvPr id="1" name=""/>
+        <p:cNvGrpSpPr/>
+        <p:nvPr/>
+      </p:nvGrpSpPr>
+      <p:grpSpPr>
+        <a:xfrm>
+          <a:off x="0" y="0"/>
+          <a:ext cx="0" cy="0"/>
+          <a:chOff x="0" y="0"/>
+          <a:chExt cx="0" cy="0"/>
+        </a:xfrm>
+      </p:grpSpPr>
+      <p:sp>
+        <p:nvSpPr>
+          <p:cNvPr id="2" name="Title 1">
+            <a:extLst>
+              <a:ext uri="{FF2B5EF4-FFF2-40B4-BE49-F238E27FC236}">
                 <a16:creationId xmlns:a16="http://schemas.microsoft.com/office/drawing/2014/main" id="{89F9C24E-95FD-42E9-BBA5-0AFA80A9E069}"/>
               </a:ext>
             </a:extLst>
@@ -16762,28 +17385,18 @@
               <a:rPr lang="en-US" dirty="0"/>
               <a:t> repo: </a:t>
             </a:r>
-          </a:p>
-          <a:p>
-            <a:r>
-              <a:rPr lang="en-US" dirty="0" err="1"/>
-              <a:t>Gforth</a:t>
-            </a:r>
-            <a:r>
-              <a:rPr lang="en-US" dirty="0"/>
-              <a:t>: </a:t>
-            </a:r>
             <a:r>
               <a:rPr lang="en-US" dirty="0">
                 <a:hlinkClick r:id="rId2"/>
               </a:rPr>
-              <a:t>https://www.gnu.org/software/gforth/</a:t>
+              <a:t>https://github.com/djohn833/forth-presentation</a:t>
             </a:r>
             <a:endParaRPr lang="en-US" dirty="0"/>
           </a:p>
           <a:p>
             <a:r>
               <a:rPr lang="en-US" dirty="0" err="1"/>
-              <a:t>Punyforth</a:t>
+              <a:t>Gforth</a:t>
             </a:r>
             <a:r>
               <a:rPr lang="en-US" dirty="0"/>
@@ -16793,19 +17406,36 @@
               <a:rPr lang="en-US" dirty="0">
                 <a:hlinkClick r:id="rId3"/>
               </a:rPr>
-              <a:t>https://github.com/zeroflag/punyforth</a:t>
+              <a:t>https://www.gnu.org/software/gforth/</a:t>
             </a:r>
             <a:endParaRPr lang="en-US" dirty="0"/>
           </a:p>
           <a:p>
             <a:r>
-              <a:rPr lang="en-US" dirty="0"/>
-              <a:t>ESP8266: </a:t>
+              <a:rPr lang="en-US" dirty="0" err="1"/>
+              <a:t>Punyforth</a:t>
+            </a:r>
+            <a:r>
+              <a:rPr lang="en-US" dirty="0"/>
+              <a:t>: </a:t>
             </a:r>
             <a:r>
               <a:rPr lang="en-US" dirty="0">
                 <a:hlinkClick r:id="rId4"/>
               </a:rPr>
+              <a:t>https://github.com/zeroflag/punyforth</a:t>
+            </a:r>
+            <a:endParaRPr lang="en-US" dirty="0"/>
+          </a:p>
+          <a:p>
+            <a:r>
+              <a:rPr lang="en-US" dirty="0"/>
+              <a:t>ESP8266: </a:t>
+            </a:r>
+            <a:r>
+              <a:rPr lang="en-US" dirty="0">
+                <a:hlinkClick r:id="rId5"/>
+              </a:rPr>
               <a:t>https://en.wikipedia.org/wiki/ESP8266</a:t>
             </a:r>
             <a:endParaRPr lang="en-US" dirty="0"/>
@@ -16821,7 +17451,7 @@
             </a:r>
             <a:r>
               <a:rPr lang="en-US" dirty="0">
-                <a:hlinkClick r:id="rId5"/>
+                <a:hlinkClick r:id="rId6"/>
               </a:rPr>
               <a:t>http://freeware.the-meiers.org/</a:t>
             </a:r>
@@ -16842,7 +17472,7 @@
 </p:sld>
 </file>
 
-<file path=ppt/slides/slide47.xml><?xml version="1.0" encoding="utf-8"?>
+<file path=ppt/slides/slide48.xml><?xml version="1.0" encoding="utf-8"?>
 <p:sld xmlns:a="http://schemas.openxmlformats.org/drawingml/2006/main" xmlns:r="http://schemas.openxmlformats.org/officeDocument/2006/relationships" xmlns:p="http://schemas.openxmlformats.org/presentationml/2006/main">
   <p:cSld>
     <p:spTree>
@@ -17027,7 +17657,7 @@
           <p:cNvPr id="2" name="Title 1">
             <a:extLst>
               <a:ext uri="{FF2B5EF4-FFF2-40B4-BE49-F238E27FC236}">
-                <a16:creationId xmlns:a16="http://schemas.microsoft.com/office/drawing/2014/main" id="{ABEA5E01-B4E4-4845-AD48-991880B20918}"/>
+                <a16:creationId xmlns:a16="http://schemas.microsoft.com/office/drawing/2014/main" id="{4A7FCD9C-DFB0-4CB0-B0FE-70E1E5E47826}"/>
               </a:ext>
             </a:extLst>
           </p:cNvPr>
@@ -17045,7 +17675,7 @@
           <a:p>
             <a:r>
               <a:rPr lang="en-US" dirty="0"/>
-              <a:t>.NET IL</a:t>
+              <a:t>Examples of stack-based intermediate languages</a:t>
             </a:r>
           </a:p>
         </p:txBody>
@@ -17055,7 +17685,7 @@
           <p:cNvPr id="3" name="Content Placeholder 2">
             <a:extLst>
               <a:ext uri="{FF2B5EF4-FFF2-40B4-BE49-F238E27FC236}">
-                <a16:creationId xmlns:a16="http://schemas.microsoft.com/office/drawing/2014/main" id="{CB6CEA62-7F7A-4C56-9176-EAF1A96D35DC}"/>
+                <a16:creationId xmlns:a16="http://schemas.microsoft.com/office/drawing/2014/main" id="{FF38CA43-0090-4EAC-B0C8-EF8CF74FB2CE}"/>
               </a:ext>
             </a:extLst>
           </p:cNvPr>
@@ -17071,63 +17701,21 @@
           <a:bodyPr/>
           <a:lstStyle/>
           <a:p>
-            <a:pPr marL="0" indent="0">
-              <a:buNone/>
-            </a:pPr>
-            <a:r>
-              <a:rPr lang="en-US" dirty="0"/>
-              <a:t>public static </a:t>
-            </a:r>
+            <a:r>
+              <a:rPr lang="en-US" dirty="0"/>
+              <a:t>.NET IL</a:t>
+            </a:r>
+          </a:p>
+          <a:p>
+            <a:r>
+              <a:rPr lang="en-US" dirty="0"/>
+              <a:t>Java Bytecode</a:t>
+            </a:r>
+          </a:p>
+          <a:p>
             <a:r>
               <a:rPr lang="en-US" dirty="0" err="1"/>
-              <a:t>int</a:t>
-            </a:r>
-            <a:r>
-              <a:rPr lang="en-US" dirty="0"/>
-              <a:t> Add(</a:t>
-            </a:r>
-            <a:r>
-              <a:rPr lang="en-US" dirty="0" err="1"/>
-              <a:t>int</a:t>
-            </a:r>
-            <a:r>
-              <a:rPr lang="en-US" dirty="0"/>
-              <a:t> a, </a:t>
-            </a:r>
-            <a:r>
-              <a:rPr lang="en-US" dirty="0" err="1"/>
-              <a:t>int</a:t>
-            </a:r>
-            <a:r>
-              <a:rPr lang="en-US" dirty="0"/>
-              <a:t> b) =&gt; a + b;</a:t>
-            </a:r>
-          </a:p>
-          <a:p>
-            <a:pPr marL="0" indent="0">
-              <a:buNone/>
-            </a:pPr>
-            <a:r>
-              <a:rPr lang="it-IT" dirty="0"/>
-              <a:t>IL_0000: ldarg.0</a:t>
-            </a:r>
-          </a:p>
-          <a:p>
-            <a:pPr marL="0" indent="0">
-              <a:buNone/>
-            </a:pPr>
-            <a:r>
-              <a:rPr lang="it-IT" dirty="0"/>
-              <a:t>IL_0001: ldarg.1</a:t>
-            </a:r>
-          </a:p>
-          <a:p>
-            <a:pPr marL="0" indent="0">
-              <a:buNone/>
-            </a:pPr>
-            <a:r>
-              <a:rPr lang="it-IT" dirty="0"/>
-              <a:t>IL_0002: add</a:t>
+              <a:t>Webassembly</a:t>
             </a:r>
             <a:endParaRPr lang="en-US" dirty="0"/>
           </a:p>
@@ -17136,7 +17724,7 @@
     </p:spTree>
     <p:extLst>
       <p:ext uri="{BB962C8B-B14F-4D97-AF65-F5344CB8AC3E}">
-        <p14:creationId xmlns:p14="http://schemas.microsoft.com/office/powerpoint/2010/main" val="651976989"/>
+        <p14:creationId xmlns:p14="http://schemas.microsoft.com/office/powerpoint/2010/main" val="4001519772"/>
       </p:ext>
     </p:extLst>
   </p:cSld>
@@ -17168,7 +17756,7 @@
           <p:cNvPr id="2" name="Title 1">
             <a:extLst>
               <a:ext uri="{FF2B5EF4-FFF2-40B4-BE49-F238E27FC236}">
-                <a16:creationId xmlns:a16="http://schemas.microsoft.com/office/drawing/2014/main" id="{087470C5-CA07-4BCA-B01D-4F580E8FC6A8}"/>
+                <a16:creationId xmlns:a16="http://schemas.microsoft.com/office/drawing/2014/main" id="{ABEA5E01-B4E4-4845-AD48-991880B20918}"/>
               </a:ext>
             </a:extLst>
           </p:cNvPr>
@@ -17186,7 +17774,7 @@
           <a:p>
             <a:r>
               <a:rPr lang="en-US" dirty="0"/>
-              <a:t>Java bytecode</a:t>
+              <a:t>.NET IL</a:t>
             </a:r>
           </a:p>
         </p:txBody>
@@ -17196,7 +17784,7 @@
           <p:cNvPr id="3" name="Content Placeholder 2">
             <a:extLst>
               <a:ext uri="{FF2B5EF4-FFF2-40B4-BE49-F238E27FC236}">
-                <a16:creationId xmlns:a16="http://schemas.microsoft.com/office/drawing/2014/main" id="{62FCC5B8-EE81-48D9-BBE2-E95D84CA4258}"/>
+                <a16:creationId xmlns:a16="http://schemas.microsoft.com/office/drawing/2014/main" id="{CB6CEA62-7F7A-4C56-9176-EAF1A96D35DC}"/>
               </a:ext>
             </a:extLst>
           </p:cNvPr>
@@ -17209,9 +17797,7 @@
         </p:nvSpPr>
         <p:spPr/>
         <p:txBody>
-          <a:bodyPr>
-            <a:normAutofit/>
-          </a:bodyPr>
+          <a:bodyPr/>
           <a:lstStyle/>
           <a:p>
             <a:pPr marL="0" indent="0">
@@ -17227,7 +17813,7 @@
             </a:r>
             <a:r>
               <a:rPr lang="en-US" dirty="0"/>
-              <a:t> add(</a:t>
+              <a:t> Add(</a:t>
             </a:r>
             <a:r>
               <a:rPr lang="en-US" dirty="0" err="1"/>
@@ -17243,39 +17829,34 @@
             </a:r>
             <a:r>
               <a:rPr lang="en-US" dirty="0"/>
-              <a:t> b) { return a + b; }</a:t>
-            </a:r>
-            <a:br>
-              <a:rPr lang="en-US" dirty="0"/>
-            </a:br>
-            <a:r>
-              <a:rPr lang="en-US" dirty="0"/>
-              <a:t>Code:</a:t>
-            </a:r>
-            <a:br>
-              <a:rPr lang="en-US" dirty="0"/>
-            </a:br>
-            <a:r>
-              <a:rPr lang="en-US" dirty="0"/>
-              <a:t>       0: iload_0</a:t>
-            </a:r>
-            <a:br>
-              <a:rPr lang="en-US" dirty="0"/>
-            </a:br>
-            <a:r>
-              <a:rPr lang="en-US" dirty="0"/>
-              <a:t>       1: iload_1</a:t>
-            </a:r>
-            <a:br>
-              <a:rPr lang="en-US" dirty="0"/>
-            </a:br>
-            <a:r>
-              <a:rPr lang="en-US" dirty="0"/>
-              <a:t>       2: </a:t>
-            </a:r>
-            <a:r>
-              <a:rPr lang="en-US" dirty="0" err="1"/>
-              <a:t>iadd</a:t>
+              <a:t> b) =&gt; a + b;</a:t>
+            </a:r>
+          </a:p>
+          <a:p>
+            <a:pPr marL="0" indent="0">
+              <a:buNone/>
+            </a:pPr>
+            <a:r>
+              <a:rPr lang="it-IT" dirty="0"/>
+              <a:t>IL_0000: ldarg.0</a:t>
+            </a:r>
+          </a:p>
+          <a:p>
+            <a:pPr marL="0" indent="0">
+              <a:buNone/>
+            </a:pPr>
+            <a:r>
+              <a:rPr lang="it-IT" dirty="0"/>
+              <a:t>IL_0001: ldarg.1</a:t>
+            </a:r>
+          </a:p>
+          <a:p>
+            <a:pPr marL="0" indent="0">
+              <a:buNone/>
+            </a:pPr>
+            <a:r>
+              <a:rPr lang="it-IT" dirty="0"/>
+              <a:t>IL_0002: add</a:t>
             </a:r>
             <a:endParaRPr lang="en-US" dirty="0"/>
           </a:p>
@@ -17284,7 +17865,7 @@
     </p:spTree>
     <p:extLst>
       <p:ext uri="{BB962C8B-B14F-4D97-AF65-F5344CB8AC3E}">
-        <p14:creationId xmlns:p14="http://schemas.microsoft.com/office/powerpoint/2010/main" val="1565553209"/>
+        <p14:creationId xmlns:p14="http://schemas.microsoft.com/office/powerpoint/2010/main" val="651976989"/>
       </p:ext>
     </p:extLst>
   </p:cSld>
@@ -17316,7 +17897,7 @@
           <p:cNvPr id="2" name="Title 1">
             <a:extLst>
               <a:ext uri="{FF2B5EF4-FFF2-40B4-BE49-F238E27FC236}">
-                <a16:creationId xmlns:a16="http://schemas.microsoft.com/office/drawing/2014/main" id="{F53AC40A-38B9-4186-AA5B-9798C0C57B58}"/>
+                <a16:creationId xmlns:a16="http://schemas.microsoft.com/office/drawing/2014/main" id="{087470C5-CA07-4BCA-B01D-4F580E8FC6A8}"/>
               </a:ext>
             </a:extLst>
           </p:cNvPr>
@@ -17333,10 +17914,9 @@
           <a:lstStyle/>
           <a:p>
             <a:r>
-              <a:rPr lang="en-US" dirty="0" err="1"/>
-              <a:t>webassembly</a:t>
-            </a:r>
-            <a:endParaRPr lang="en-US" dirty="0"/>
+              <a:rPr lang="en-US" dirty="0"/>
+              <a:t>Java bytecode</a:t>
+            </a:r>
           </a:p>
         </p:txBody>
       </p:sp>
@@ -17345,7 +17925,7 @@
           <p:cNvPr id="3" name="Content Placeholder 2">
             <a:extLst>
               <a:ext uri="{FF2B5EF4-FFF2-40B4-BE49-F238E27FC236}">
-                <a16:creationId xmlns:a16="http://schemas.microsoft.com/office/drawing/2014/main" id="{814F20C3-66D8-46FE-8C6F-9E5F3EA0271F}"/>
+                <a16:creationId xmlns:a16="http://schemas.microsoft.com/office/drawing/2014/main" id="{62FCC5B8-EE81-48D9-BBE2-E95D84CA4258}"/>
               </a:ext>
             </a:extLst>
           </p:cNvPr>
@@ -17367,6 +17947,10 @@
               <a:buNone/>
             </a:pPr>
             <a:r>
+              <a:rPr lang="en-US" dirty="0"/>
+              <a:t>public static </a:t>
+            </a:r>
+            <a:r>
               <a:rPr lang="en-US" dirty="0" err="1"/>
               <a:t>int</a:t>
             </a:r>
@@ -17390,68 +17974,39 @@
               <a:rPr lang="en-US" dirty="0"/>
               <a:t> b) { return a + b; }</a:t>
             </a:r>
-          </a:p>
-          <a:p>
-            <a:pPr marL="0" indent="0">
-              <a:buNone/>
-            </a:pPr>
-            <a:r>
-              <a:rPr lang="en-US" dirty="0"/>
-              <a:t>000003c: 20 ; </a:t>
+            <a:br>
+              <a:rPr lang="en-US" dirty="0"/>
+            </a:br>
+            <a:r>
+              <a:rPr lang="en-US" dirty="0"/>
+              <a:t>0: iload_0</a:t>
+            </a:r>
+            <a:br>
+              <a:rPr lang="en-US" dirty="0"/>
+            </a:br>
+            <a:r>
+              <a:rPr lang="en-US" dirty="0"/>
+              <a:t>1: iload_1</a:t>
+            </a:r>
+            <a:br>
+              <a:rPr lang="en-US" dirty="0"/>
+            </a:br>
+            <a:r>
+              <a:rPr lang="en-US" dirty="0"/>
+              <a:t>2: </a:t>
             </a:r>
             <a:r>
               <a:rPr lang="en-US" dirty="0" err="1"/>
-              <a:t>get_local</a:t>
+              <a:t>iadd</a:t>
             </a:r>
             <a:endParaRPr lang="en-US" dirty="0"/>
-          </a:p>
-          <a:p>
-            <a:pPr marL="0" indent="0">
-              <a:buNone/>
-            </a:pPr>
-            <a:r>
-              <a:rPr lang="en-US" dirty="0"/>
-              <a:t>000003d: 01 ; local index</a:t>
-            </a:r>
-          </a:p>
-          <a:p>
-            <a:pPr marL="0" indent="0">
-              <a:buNone/>
-            </a:pPr>
-            <a:r>
-              <a:rPr lang="en-US" dirty="0"/>
-              <a:t>000003e: 20 ; </a:t>
-            </a:r>
-            <a:r>
-              <a:rPr lang="en-US" dirty="0" err="1"/>
-              <a:t>get_local</a:t>
-            </a:r>
-            <a:endParaRPr lang="en-US" dirty="0"/>
-          </a:p>
-          <a:p>
-            <a:pPr marL="0" indent="0">
-              <a:buNone/>
-            </a:pPr>
-            <a:r>
-              <a:rPr lang="en-US" dirty="0"/>
-              <a:t>000003f: 00 ; local index</a:t>
-            </a:r>
-          </a:p>
-          <a:p>
-            <a:pPr marL="0" indent="0">
-              <a:buNone/>
-            </a:pPr>
-            <a:r>
-              <a:rPr lang="en-US" dirty="0"/>
-              <a:t>0000040: 6a ; i32.add</a:t>
-            </a:r>
           </a:p>
         </p:txBody>
       </p:sp>
     </p:spTree>
     <p:extLst>
       <p:ext uri="{BB962C8B-B14F-4D97-AF65-F5344CB8AC3E}">
-        <p14:creationId xmlns:p14="http://schemas.microsoft.com/office/powerpoint/2010/main" val="2063089257"/>
+        <p14:creationId xmlns:p14="http://schemas.microsoft.com/office/powerpoint/2010/main" val="1565553209"/>
       </p:ext>
     </p:extLst>
   </p:cSld>
@@ -17483,7 +18038,7 @@
           <p:cNvPr id="2" name="Title 1">
             <a:extLst>
               <a:ext uri="{FF2B5EF4-FFF2-40B4-BE49-F238E27FC236}">
-                <a16:creationId xmlns:a16="http://schemas.microsoft.com/office/drawing/2014/main" id="{DAF2225E-2D77-4A95-9FF3-89F2FBA0A6E2}"/>
+                <a16:creationId xmlns:a16="http://schemas.microsoft.com/office/drawing/2014/main" id="{F53AC40A-38B9-4186-AA5B-9798C0C57B58}"/>
               </a:ext>
             </a:extLst>
           </p:cNvPr>
@@ -17500,9 +18055,10 @@
           <a:lstStyle/>
           <a:p>
             <a:r>
-              <a:rPr lang="en-US" dirty="0"/>
-              <a:t>Stacks in forth</a:t>
-            </a:r>
+              <a:rPr lang="en-US" dirty="0" err="1"/>
+              <a:t>webassembly</a:t>
+            </a:r>
+            <a:endParaRPr lang="en-US" dirty="0"/>
           </a:p>
         </p:txBody>
       </p:sp>
@@ -17511,7 +18067,7 @@
           <p:cNvPr id="3" name="Content Placeholder 2">
             <a:extLst>
               <a:ext uri="{FF2B5EF4-FFF2-40B4-BE49-F238E27FC236}">
-                <a16:creationId xmlns:a16="http://schemas.microsoft.com/office/drawing/2014/main" id="{6EF7B1BF-916B-460D-A3E2-762A1A2621A6}"/>
+                <a16:creationId xmlns:a16="http://schemas.microsoft.com/office/drawing/2014/main" id="{814F20C3-66D8-46FE-8C6F-9E5F3EA0271F}"/>
               </a:ext>
             </a:extLst>
           </p:cNvPr>
@@ -17524,35 +18080,100 @@
         </p:nvSpPr>
         <p:spPr/>
         <p:txBody>
-          <a:bodyPr/>
+          <a:bodyPr>
+            <a:normAutofit/>
+          </a:bodyPr>
           <a:lstStyle/>
           <a:p>
-            <a:r>
-              <a:rPr lang="en-US" dirty="0"/>
-              <a:t>Forth stacks are made of cells</a:t>
-            </a:r>
-          </a:p>
-          <a:p>
-            <a:r>
-              <a:rPr lang="en-US" dirty="0"/>
-              <a:t>The data stack is the primary way data is used and manipulated in Forth</a:t>
-            </a:r>
-          </a:p>
-          <a:p>
-            <a:r>
-              <a:rPr lang="en-US" dirty="0"/>
-              <a:t>The return stack is used for “function calls” and looping, but is also accessible to the developer as a temporary storage area</a:t>
-            </a:r>
-          </a:p>
-          <a:p>
+            <a:pPr marL="0" indent="0">
+              <a:buNone/>
+            </a:pPr>
+            <a:r>
+              <a:rPr lang="en-US" dirty="0" err="1"/>
+              <a:t>int</a:t>
+            </a:r>
+            <a:r>
+              <a:rPr lang="en-US" dirty="0"/>
+              <a:t> add(</a:t>
+            </a:r>
+            <a:r>
+              <a:rPr lang="en-US" dirty="0" err="1"/>
+              <a:t>int</a:t>
+            </a:r>
+            <a:r>
+              <a:rPr lang="en-US" dirty="0"/>
+              <a:t> a, </a:t>
+            </a:r>
+            <a:r>
+              <a:rPr lang="en-US" dirty="0" err="1"/>
+              <a:t>int</a:t>
+            </a:r>
+            <a:r>
+              <a:rPr lang="en-US" dirty="0"/>
+              <a:t> b) { return a + b; }</a:t>
+            </a:r>
+          </a:p>
+          <a:p>
+            <a:pPr marL="0" indent="0">
+              <a:buNone/>
+            </a:pPr>
+            <a:r>
+              <a:rPr lang="en-US" dirty="0"/>
+              <a:t>000003c: 20 ; </a:t>
+            </a:r>
+            <a:r>
+              <a:rPr lang="en-US" dirty="0" err="1"/>
+              <a:t>get_local</a:t>
+            </a:r>
             <a:endParaRPr lang="en-US" dirty="0"/>
+          </a:p>
+          <a:p>
+            <a:pPr marL="0" indent="0">
+              <a:buNone/>
+            </a:pPr>
+            <a:r>
+              <a:rPr lang="en-US" dirty="0"/>
+              <a:t>000003d: 01 ; local index</a:t>
+            </a:r>
+          </a:p>
+          <a:p>
+            <a:pPr marL="0" indent="0">
+              <a:buNone/>
+            </a:pPr>
+            <a:r>
+              <a:rPr lang="en-US" dirty="0"/>
+              <a:t>000003e: 20 ; </a:t>
+            </a:r>
+            <a:r>
+              <a:rPr lang="en-US" dirty="0" err="1"/>
+              <a:t>get_local</a:t>
+            </a:r>
+            <a:endParaRPr lang="en-US" dirty="0"/>
+          </a:p>
+          <a:p>
+            <a:pPr marL="0" indent="0">
+              <a:buNone/>
+            </a:pPr>
+            <a:r>
+              <a:rPr lang="en-US" dirty="0"/>
+              <a:t>000003f: 00 ; local index</a:t>
+            </a:r>
+          </a:p>
+          <a:p>
+            <a:pPr marL="0" indent="0">
+              <a:buNone/>
+            </a:pPr>
+            <a:r>
+              <a:rPr lang="en-US" dirty="0"/>
+              <a:t>0000040: 6a ; i32.add</a:t>
+            </a:r>
           </a:p>
         </p:txBody>
       </p:sp>
     </p:spTree>
     <p:extLst>
       <p:ext uri="{BB962C8B-B14F-4D97-AF65-F5344CB8AC3E}">
-        <p14:creationId xmlns:p14="http://schemas.microsoft.com/office/powerpoint/2010/main" val="2476437988"/>
+        <p14:creationId xmlns:p14="http://schemas.microsoft.com/office/powerpoint/2010/main" val="2063089257"/>
       </p:ext>
     </p:extLst>
   </p:cSld>
@@ -17584,7 +18205,7 @@
           <p:cNvPr id="2" name="Title 1">
             <a:extLst>
               <a:ext uri="{FF2B5EF4-FFF2-40B4-BE49-F238E27FC236}">
-                <a16:creationId xmlns:a16="http://schemas.microsoft.com/office/drawing/2014/main" id="{6BA2DF35-CFE7-4D01-806F-7250FB9DE2F2}"/>
+                <a16:creationId xmlns:a16="http://schemas.microsoft.com/office/drawing/2014/main" id="{DAF2225E-2D77-4A95-9FF3-89F2FBA0A6E2}"/>
               </a:ext>
             </a:extLst>
           </p:cNvPr>
@@ -17602,7 +18223,7 @@
           <a:p>
             <a:r>
               <a:rPr lang="en-US" dirty="0"/>
-              <a:t>Stack comments	</a:t>
+              <a:t>Stacks in forth</a:t>
             </a:r>
           </a:p>
         </p:txBody>
@@ -17612,7 +18233,7 @@
           <p:cNvPr id="3" name="Content Placeholder 2">
             <a:extLst>
               <a:ext uri="{FF2B5EF4-FFF2-40B4-BE49-F238E27FC236}">
-                <a16:creationId xmlns:a16="http://schemas.microsoft.com/office/drawing/2014/main" id="{8EBBCD17-21A7-47A4-B41B-83E9FD2797DD}"/>
+                <a16:creationId xmlns:a16="http://schemas.microsoft.com/office/drawing/2014/main" id="{6EF7B1BF-916B-460D-A3E2-762A1A2621A6}"/>
               </a:ext>
             </a:extLst>
           </p:cNvPr>
@@ -17629,68 +18250,31 @@
           <a:lstStyle/>
           <a:p>
             <a:r>
-              <a:rPr lang="en-US" dirty="0" err="1"/>
-              <a:t>Forth’s</a:t>
-            </a:r>
-            <a:r>
-              <a:rPr lang="en-US" dirty="0"/>
-              <a:t> version of a function signature</a:t>
-            </a:r>
-          </a:p>
-          <a:p>
-            <a:r>
-              <a:rPr lang="en-US" dirty="0"/>
-              <a:t>E.g., ( x1 x2 -- f ) means the word takes two cells and returns a flag</a:t>
-            </a:r>
-          </a:p>
-          <a:p>
-            <a:r>
-              <a:rPr lang="en-US" dirty="0"/>
-              <a:t>Customary abbreviations</a:t>
-            </a:r>
-          </a:p>
-          <a:p>
-            <a:pPr lvl="1"/>
-            <a:r>
-              <a:rPr lang="en-US" dirty="0"/>
-              <a:t>W – a general cell</a:t>
-            </a:r>
-          </a:p>
-          <a:p>
-            <a:pPr lvl="1"/>
-            <a:r>
-              <a:rPr lang="en-US" dirty="0"/>
-              <a:t>N – a signed integer</a:t>
-            </a:r>
-          </a:p>
-          <a:p>
-            <a:pPr lvl="1"/>
-            <a:r>
-              <a:rPr lang="en-US" dirty="0"/>
-              <a:t>U – an unsigned integer</a:t>
-            </a:r>
-          </a:p>
-          <a:p>
-            <a:pPr lvl="1"/>
-            <a:r>
-              <a:rPr lang="en-US" dirty="0"/>
-              <a:t>F – a flag (</a:t>
-            </a:r>
-            <a:r>
-              <a:rPr lang="en-US" dirty="0" err="1"/>
-              <a:t>boolean</a:t>
-            </a:r>
-            <a:r>
-              <a:rPr lang="en-US" dirty="0"/>
-              <a:t>)</a:t>
-            </a:r>
+              <a:rPr lang="en-US" dirty="0"/>
+              <a:t>Forth stacks are made of cells</a:t>
+            </a:r>
+          </a:p>
+          <a:p>
+            <a:r>
+              <a:rPr lang="en-US" dirty="0"/>
+              <a:t>The data stack is the primary way data is used and manipulated in Forth</a:t>
+            </a:r>
+          </a:p>
+          <a:p>
+            <a:r>
+              <a:rPr lang="en-US" dirty="0"/>
+              <a:t>The return stack is used for “function calls” and looping, but is also accessible to the developer as a temporary storage area</a:t>
+            </a:r>
+          </a:p>
+          <a:p>
+            <a:endParaRPr lang="en-US" dirty="0"/>
           </a:p>
         </p:txBody>
       </p:sp>
     </p:spTree>
     <p:extLst>
       <p:ext uri="{BB962C8B-B14F-4D97-AF65-F5344CB8AC3E}">
-        <p14:creationId xmlns:p14="http://schemas.microsoft.com/office/powerpoint/2010/main" val="2174521702"/>
+        <p14:creationId xmlns:p14="http://schemas.microsoft.com/office/powerpoint/2010/main" val="2476437988"/>
       </p:ext>
     </p:extLst>
   </p:cSld>
@@ -17949,4 +18533,299 @@
     </a:ext>
   </a:extLst>
 </a:theme>
+</file>
+
+<file path=ppt/theme/theme2.xml><?xml version="1.0" encoding="utf-8"?>
+<a:theme xmlns:a="http://schemas.openxmlformats.org/drawingml/2006/main" name="Office Theme">
+  <a:themeElements>
+    <a:clrScheme name="Office">
+      <a:dk1>
+        <a:sysClr val="windowText" lastClr="000000"/>
+      </a:dk1>
+      <a:lt1>
+        <a:sysClr val="window" lastClr="FFFFFF"/>
+      </a:lt1>
+      <a:dk2>
+        <a:srgbClr val="44546A"/>
+      </a:dk2>
+      <a:lt2>
+        <a:srgbClr val="E7E6E6"/>
+      </a:lt2>
+      <a:accent1>
+        <a:srgbClr val="4472C4"/>
+      </a:accent1>
+      <a:accent2>
+        <a:srgbClr val="ED7D31"/>
+      </a:accent2>
+      <a:accent3>
+        <a:srgbClr val="A5A5A5"/>
+      </a:accent3>
+      <a:accent4>
+        <a:srgbClr val="FFC000"/>
+      </a:accent4>
+      <a:accent5>
+        <a:srgbClr val="5B9BD5"/>
+      </a:accent5>
+      <a:accent6>
+        <a:srgbClr val="70AD47"/>
+      </a:accent6>
+      <a:hlink>
+        <a:srgbClr val="0563C1"/>
+      </a:hlink>
+      <a:folHlink>
+        <a:srgbClr val="954F72"/>
+      </a:folHlink>
+    </a:clrScheme>
+    <a:fontScheme name="Office">
+      <a:majorFont>
+        <a:latin typeface="Calibri Light" panose="020F0302020204030204"/>
+        <a:ea typeface=""/>
+        <a:cs typeface=""/>
+        <a:font script="Jpan" typeface="游ゴシック Light"/>
+        <a:font script="Hang" typeface="맑은 고딕"/>
+        <a:font script="Hans" typeface="等线 Light"/>
+        <a:font script="Hant" typeface="新細明體"/>
+        <a:font script="Arab" typeface="Times New Roman"/>
+        <a:font script="Hebr" typeface="Times New Roman"/>
+        <a:font script="Thai" typeface="Angsana New"/>
+        <a:font script="Ethi" typeface="Nyala"/>
+        <a:font script="Beng" typeface="Vrinda"/>
+        <a:font script="Gujr" typeface="Shruti"/>
+        <a:font script="Khmr" typeface="MoolBoran"/>
+        <a:font script="Knda" typeface="Tunga"/>
+        <a:font script="Guru" typeface="Raavi"/>
+        <a:font script="Cans" typeface="Euphemia"/>
+        <a:font script="Cher" typeface="Plantagenet Cherokee"/>
+        <a:font script="Yiii" typeface="Microsoft Yi Baiti"/>
+        <a:font script="Tibt" typeface="Microsoft Himalaya"/>
+        <a:font script="Thaa" typeface="MV Boli"/>
+        <a:font script="Deva" typeface="Mangal"/>
+        <a:font script="Telu" typeface="Gautami"/>
+        <a:font script="Taml" typeface="Latha"/>
+        <a:font script="Syrc" typeface="Estrangelo Edessa"/>
+        <a:font script="Orya" typeface="Kalinga"/>
+        <a:font script="Mlym" typeface="Kartika"/>
+        <a:font script="Laoo" typeface="DokChampa"/>
+        <a:font script="Sinh" typeface="Iskoola Pota"/>
+        <a:font script="Mong" typeface="Mongolian Baiti"/>
+        <a:font script="Viet" typeface="Times New Roman"/>
+        <a:font script="Uigh" typeface="Microsoft Uighur"/>
+        <a:font script="Geor" typeface="Sylfaen"/>
+        <a:font script="Armn" typeface="Arial"/>
+        <a:font script="Bugi" typeface="Leelawadee UI"/>
+        <a:font script="Bopo" typeface="Microsoft JhengHei"/>
+        <a:font script="Java" typeface="Javanese Text"/>
+        <a:font script="Lisu" typeface="Segoe UI"/>
+        <a:font script="Mymr" typeface="Myanmar Text"/>
+        <a:font script="Nkoo" typeface="Ebrima"/>
+        <a:font script="Olck" typeface="Nirmala UI"/>
+        <a:font script="Osma" typeface="Ebrima"/>
+        <a:font script="Phag" typeface="Phagspa"/>
+        <a:font script="Syrn" typeface="Estrangelo Edessa"/>
+        <a:font script="Syrj" typeface="Estrangelo Edessa"/>
+        <a:font script="Syre" typeface="Estrangelo Edessa"/>
+        <a:font script="Sora" typeface="Nirmala UI"/>
+        <a:font script="Tale" typeface="Microsoft Tai Le"/>
+        <a:font script="Talu" typeface="Microsoft New Tai Lue"/>
+        <a:font script="Tfng" typeface="Ebrima"/>
+      </a:majorFont>
+      <a:minorFont>
+        <a:latin typeface="Calibri" panose="020F0502020204030204"/>
+        <a:ea typeface=""/>
+        <a:cs typeface=""/>
+        <a:font script="Jpan" typeface="游ゴシック"/>
+        <a:font script="Hang" typeface="맑은 고딕"/>
+        <a:font script="Hans" typeface="等线"/>
+        <a:font script="Hant" typeface="新細明體"/>
+        <a:font script="Arab" typeface="Arial"/>
+        <a:font script="Hebr" typeface="Arial"/>
+        <a:font script="Thai" typeface="Cordia New"/>
+        <a:font script="Ethi" typeface="Nyala"/>
+        <a:font script="Beng" typeface="Vrinda"/>
+        <a:font script="Gujr" typeface="Shruti"/>
+        <a:font script="Khmr" typeface="DaunPenh"/>
+        <a:font script="Knda" typeface="Tunga"/>
+        <a:font script="Guru" typeface="Raavi"/>
+        <a:font script="Cans" typeface="Euphemia"/>
+        <a:font script="Cher" typeface="Plantagenet Cherokee"/>
+        <a:font script="Yiii" typeface="Microsoft Yi Baiti"/>
+        <a:font script="Tibt" typeface="Microsoft Himalaya"/>
+        <a:font script="Thaa" typeface="MV Boli"/>
+        <a:font script="Deva" typeface="Mangal"/>
+        <a:font script="Telu" typeface="Gautami"/>
+        <a:font script="Taml" typeface="Latha"/>
+        <a:font script="Syrc" typeface="Estrangelo Edessa"/>
+        <a:font script="Orya" typeface="Kalinga"/>
+        <a:font script="Mlym" typeface="Kartika"/>
+        <a:font script="Laoo" typeface="DokChampa"/>
+        <a:font script="Sinh" typeface="Iskoola Pota"/>
+        <a:font script="Mong" typeface="Mongolian Baiti"/>
+        <a:font script="Viet" typeface="Arial"/>
+        <a:font script="Uigh" typeface="Microsoft Uighur"/>
+        <a:font script="Geor" typeface="Sylfaen"/>
+        <a:font script="Armn" typeface="Arial"/>
+        <a:font script="Bugi" typeface="Leelawadee UI"/>
+        <a:font script="Bopo" typeface="Microsoft JhengHei"/>
+        <a:font script="Java" typeface="Javanese Text"/>
+        <a:font script="Lisu" typeface="Segoe UI"/>
+        <a:font script="Mymr" typeface="Myanmar Text"/>
+        <a:font script="Nkoo" typeface="Ebrima"/>
+        <a:font script="Olck" typeface="Nirmala UI"/>
+        <a:font script="Osma" typeface="Ebrima"/>
+        <a:font script="Phag" typeface="Phagspa"/>
+        <a:font script="Syrn" typeface="Estrangelo Edessa"/>
+        <a:font script="Syrj" typeface="Estrangelo Edessa"/>
+        <a:font script="Syre" typeface="Estrangelo Edessa"/>
+        <a:font script="Sora" typeface="Nirmala UI"/>
+        <a:font script="Tale" typeface="Microsoft Tai Le"/>
+        <a:font script="Talu" typeface="Microsoft New Tai Lue"/>
+        <a:font script="Tfng" typeface="Ebrima"/>
+      </a:minorFont>
+    </a:fontScheme>
+    <a:fmtScheme name="Office">
+      <a:fillStyleLst>
+        <a:solidFill>
+          <a:schemeClr val="phClr"/>
+        </a:solidFill>
+        <a:gradFill rotWithShape="1">
+          <a:gsLst>
+            <a:gs pos="0">
+              <a:schemeClr val="phClr">
+                <a:lumMod val="110000"/>
+                <a:satMod val="105000"/>
+                <a:tint val="67000"/>
+              </a:schemeClr>
+            </a:gs>
+            <a:gs pos="50000">
+              <a:schemeClr val="phClr">
+                <a:lumMod val="105000"/>
+                <a:satMod val="103000"/>
+                <a:tint val="73000"/>
+              </a:schemeClr>
+            </a:gs>
+            <a:gs pos="100000">
+              <a:schemeClr val="phClr">
+                <a:lumMod val="105000"/>
+                <a:satMod val="109000"/>
+                <a:tint val="81000"/>
+              </a:schemeClr>
+            </a:gs>
+          </a:gsLst>
+          <a:lin ang="5400000" scaled="0"/>
+        </a:gradFill>
+        <a:gradFill rotWithShape="1">
+          <a:gsLst>
+            <a:gs pos="0">
+              <a:schemeClr val="phClr">
+                <a:satMod val="103000"/>
+                <a:lumMod val="102000"/>
+                <a:tint val="94000"/>
+              </a:schemeClr>
+            </a:gs>
+            <a:gs pos="50000">
+              <a:schemeClr val="phClr">
+                <a:satMod val="110000"/>
+                <a:lumMod val="100000"/>
+                <a:shade val="100000"/>
+              </a:schemeClr>
+            </a:gs>
+            <a:gs pos="100000">
+              <a:schemeClr val="phClr">
+                <a:lumMod val="99000"/>
+                <a:satMod val="120000"/>
+                <a:shade val="78000"/>
+              </a:schemeClr>
+            </a:gs>
+          </a:gsLst>
+          <a:lin ang="5400000" scaled="0"/>
+        </a:gradFill>
+      </a:fillStyleLst>
+      <a:lnStyleLst>
+        <a:ln w="6350" cap="flat" cmpd="sng" algn="ctr">
+          <a:solidFill>
+            <a:schemeClr val="phClr"/>
+          </a:solidFill>
+          <a:prstDash val="solid"/>
+          <a:miter lim="800000"/>
+        </a:ln>
+        <a:ln w="12700" cap="flat" cmpd="sng" algn="ctr">
+          <a:solidFill>
+            <a:schemeClr val="phClr"/>
+          </a:solidFill>
+          <a:prstDash val="solid"/>
+          <a:miter lim="800000"/>
+        </a:ln>
+        <a:ln w="19050" cap="flat" cmpd="sng" algn="ctr">
+          <a:solidFill>
+            <a:schemeClr val="phClr"/>
+          </a:solidFill>
+          <a:prstDash val="solid"/>
+          <a:miter lim="800000"/>
+        </a:ln>
+      </a:lnStyleLst>
+      <a:effectStyleLst>
+        <a:effectStyle>
+          <a:effectLst/>
+        </a:effectStyle>
+        <a:effectStyle>
+          <a:effectLst/>
+        </a:effectStyle>
+        <a:effectStyle>
+          <a:effectLst>
+            <a:outerShdw blurRad="57150" dist="19050" dir="5400000" algn="ctr" rotWithShape="0">
+              <a:srgbClr val="000000">
+                <a:alpha val="63000"/>
+              </a:srgbClr>
+            </a:outerShdw>
+          </a:effectLst>
+        </a:effectStyle>
+      </a:effectStyleLst>
+      <a:bgFillStyleLst>
+        <a:solidFill>
+          <a:schemeClr val="phClr"/>
+        </a:solidFill>
+        <a:solidFill>
+          <a:schemeClr val="phClr">
+            <a:tint val="95000"/>
+            <a:satMod val="170000"/>
+          </a:schemeClr>
+        </a:solidFill>
+        <a:gradFill rotWithShape="1">
+          <a:gsLst>
+            <a:gs pos="0">
+              <a:schemeClr val="phClr">
+                <a:tint val="93000"/>
+                <a:satMod val="150000"/>
+                <a:shade val="98000"/>
+                <a:lumMod val="102000"/>
+              </a:schemeClr>
+            </a:gs>
+            <a:gs pos="50000">
+              <a:schemeClr val="phClr">
+                <a:tint val="98000"/>
+                <a:satMod val="130000"/>
+                <a:shade val="90000"/>
+                <a:lumMod val="103000"/>
+              </a:schemeClr>
+            </a:gs>
+            <a:gs pos="100000">
+              <a:schemeClr val="phClr">
+                <a:shade val="63000"/>
+                <a:satMod val="120000"/>
+              </a:schemeClr>
+            </a:gs>
+          </a:gsLst>
+          <a:lin ang="5400000" scaled="0"/>
+        </a:gradFill>
+      </a:bgFillStyleLst>
+    </a:fmtScheme>
+  </a:themeElements>
+  <a:objectDefaults/>
+  <a:extraClrSchemeLst/>
+  <a:extLst>
+    <a:ext uri="{05A4C25C-085E-4340-85A3-A5531E510DB2}">
+      <thm15:themeFamily xmlns:thm15="http://schemas.microsoft.com/office/thememl/2012/main" name="Office Theme" id="{62F939B6-93AF-4DB8-9C6B-D6C7DFDC589F}" vid="{4A3C46E8-61CC-4603-A589-7422A47A8E4A}"/>
+    </a:ext>
+  </a:extLst>
+</a:theme>
 </file>
</xml_diff>